<commit_message>
Adds flow diagram to PPT
</commit_message>
<xml_diff>
--- a/Docs/ToolDesign.pptx
+++ b/Docs/ToolDesign.pptx
@@ -4,10 +4,14 @@
   <p:sldMasterIdLst>
     <p:sldMasterId id="2147483648" r:id="rId1"/>
   </p:sldMasterIdLst>
+  <p:notesMasterIdLst>
+    <p:notesMasterId r:id="rId6"/>
+  </p:notesMasterIdLst>
   <p:sldIdLst>
     <p:sldId id="256" r:id="rId2"/>
     <p:sldId id="258" r:id="rId3"/>
     <p:sldId id="257" r:id="rId4"/>
+    <p:sldId id="259" r:id="rId5"/>
   </p:sldIdLst>
   <p:sldSz cx="12192000" cy="6858000"/>
   <p:notesSz cx="6858000" cy="9144000"/>
@@ -106,7 +110,476 @@
       </a:defRPr>
     </a:lvl9pPr>
   </p:defaultTextStyle>
+  <p:extLst>
+    <p:ext uri="{EFAFB233-063F-42B5-8137-9DF3F51BA10A}">
+      <p15:sldGuideLst xmlns:p15="http://schemas.microsoft.com/office/powerpoint/2012/main"/>
+    </p:ext>
+  </p:extLst>
 </p:presentation>
+</file>
+
+<file path=ppt/commentAuthors.xml><?xml version="1.0" encoding="utf-8"?>
+<p:cmAuthorLst xmlns:a="http://schemas.openxmlformats.org/drawingml/2006/main" xmlns:r="http://schemas.openxmlformats.org/officeDocument/2006/relationships" xmlns:p="http://schemas.openxmlformats.org/presentationml/2006/main">
+  <p:cmAuthor id="1" name="John Fay" initials="JF" lastIdx="1" clrIdx="0">
+    <p:extLst>
+      <p:ext uri="{19B8F6BF-5375-455C-9EA6-DF929625EA0E}">
+        <p15:presenceInfo xmlns:p15="http://schemas.microsoft.com/office/powerpoint/2012/main" userId="John Fay" providerId="None"/>
+      </p:ext>
+    </p:extLst>
+  </p:cmAuthor>
+</p:cmAuthorLst>
+</file>
+
+<file path=ppt/comments/comment1.xml><?xml version="1.0" encoding="utf-8"?>
+<p:cmLst xmlns:a="http://schemas.openxmlformats.org/drawingml/2006/main" xmlns:r="http://schemas.openxmlformats.org/officeDocument/2006/relationships" xmlns:p="http://schemas.openxmlformats.org/presentationml/2006/main">
+  <p:cm authorId="1" dt="2016-06-14T09:54:43.958" idx="1">
+    <p:pos x="10" y="10"/>
+    <p:text>GIS tools requires a table that maps land cover modifications to specific StreamCat attribute changes. For example, a conversion of 30 HA of cropland to forest will change: (1) Pct cropland in catchment and watershed, (2) Pct wetland in catchment and watershed, ….</p:text>
+    <p:extLst>
+      <p:ext uri="{C676402C-5697-4E1C-873F-D02D1690AC5C}">
+        <p15:threadingInfo xmlns:p15="http://schemas.microsoft.com/office/powerpoint/2012/main" timeZoneBias="-600"/>
+      </p:ext>
+    </p:extLst>
+  </p:cm>
+</p:cmLst>
+</file>
+
+<file path=ppt/notesMasters/notesMaster1.xml><?xml version="1.0" encoding="utf-8"?>
+<p:notesMaster xmlns:a="http://schemas.openxmlformats.org/drawingml/2006/main" xmlns:r="http://schemas.openxmlformats.org/officeDocument/2006/relationships" xmlns:p="http://schemas.openxmlformats.org/presentationml/2006/main">
+  <p:cSld>
+    <p:bg>
+      <p:bgRef idx="1001">
+        <a:schemeClr val="bg1"/>
+      </p:bgRef>
+    </p:bg>
+    <p:spTree>
+      <p:nvGrpSpPr>
+        <p:cNvPr id="1" name=""/>
+        <p:cNvGrpSpPr/>
+        <p:nvPr/>
+      </p:nvGrpSpPr>
+      <p:grpSpPr>
+        <a:xfrm>
+          <a:off x="0" y="0"/>
+          <a:ext cx="0" cy="0"/>
+          <a:chOff x="0" y="0"/>
+          <a:chExt cx="0" cy="0"/>
+        </a:xfrm>
+      </p:grpSpPr>
+      <p:sp>
+        <p:nvSpPr>
+          <p:cNvPr id="2" name="Header Placeholder 1"/>
+          <p:cNvSpPr>
+            <a:spLocks noGrp="1"/>
+          </p:cNvSpPr>
+          <p:nvPr>
+            <p:ph type="hdr" sz="quarter"/>
+          </p:nvPr>
+        </p:nvSpPr>
+        <p:spPr>
+          <a:xfrm>
+            <a:off x="0" y="0"/>
+            <a:ext cx="2971800" cy="458788"/>
+          </a:xfrm>
+          <a:prstGeom prst="rect">
+            <a:avLst/>
+          </a:prstGeom>
+        </p:spPr>
+        <p:txBody>
+          <a:bodyPr vert="horz" lIns="91440" tIns="45720" rIns="91440" bIns="45720" rtlCol="0"/>
+          <a:lstStyle>
+            <a:lvl1pPr algn="l">
+              <a:defRPr sz="1200"/>
+            </a:lvl1pPr>
+          </a:lstStyle>
+          <a:p>
+            <a:endParaRPr lang="en-US"/>
+          </a:p>
+        </p:txBody>
+      </p:sp>
+      <p:sp>
+        <p:nvSpPr>
+          <p:cNvPr id="3" name="Date Placeholder 2"/>
+          <p:cNvSpPr>
+            <a:spLocks noGrp="1"/>
+          </p:cNvSpPr>
+          <p:nvPr>
+            <p:ph type="dt" idx="1"/>
+          </p:nvPr>
+        </p:nvSpPr>
+        <p:spPr>
+          <a:xfrm>
+            <a:off x="3884613" y="0"/>
+            <a:ext cx="2971800" cy="458788"/>
+          </a:xfrm>
+          <a:prstGeom prst="rect">
+            <a:avLst/>
+          </a:prstGeom>
+        </p:spPr>
+        <p:txBody>
+          <a:bodyPr vert="horz" lIns="91440" tIns="45720" rIns="91440" bIns="45720" rtlCol="0"/>
+          <a:lstStyle>
+            <a:lvl1pPr algn="r">
+              <a:defRPr sz="1200"/>
+            </a:lvl1pPr>
+          </a:lstStyle>
+          <a:p>
+            <a:fld id="{2E46F0EA-5151-4461-8156-A78D49B8FD41}" type="datetimeFigureOut">
+              <a:rPr lang="en-US" smtClean="0"/>
+              <a:t>6/14/2016</a:t>
+            </a:fld>
+            <a:endParaRPr lang="en-US"/>
+          </a:p>
+        </p:txBody>
+      </p:sp>
+      <p:sp>
+        <p:nvSpPr>
+          <p:cNvPr id="4" name="Slide Image Placeholder 3"/>
+          <p:cNvSpPr>
+            <a:spLocks noGrp="1" noRot="1" noChangeAspect="1"/>
+          </p:cNvSpPr>
+          <p:nvPr>
+            <p:ph type="sldImg" idx="2"/>
+          </p:nvPr>
+        </p:nvSpPr>
+        <p:spPr>
+          <a:xfrm>
+            <a:off x="685800" y="1143000"/>
+            <a:ext cx="5486400" cy="3086100"/>
+          </a:xfrm>
+          <a:prstGeom prst="rect">
+            <a:avLst/>
+          </a:prstGeom>
+          <a:noFill/>
+          <a:ln w="12700">
+            <a:solidFill>
+              <a:prstClr val="black"/>
+            </a:solidFill>
+          </a:ln>
+        </p:spPr>
+        <p:txBody>
+          <a:bodyPr vert="horz" lIns="91440" tIns="45720" rIns="91440" bIns="45720" rtlCol="0" anchor="ctr"/>
+          <a:lstStyle/>
+          <a:p>
+            <a:endParaRPr lang="en-US"/>
+          </a:p>
+        </p:txBody>
+      </p:sp>
+      <p:sp>
+        <p:nvSpPr>
+          <p:cNvPr id="5" name="Notes Placeholder 4"/>
+          <p:cNvSpPr>
+            <a:spLocks noGrp="1"/>
+          </p:cNvSpPr>
+          <p:nvPr>
+            <p:ph type="body" sz="quarter" idx="3"/>
+          </p:nvPr>
+        </p:nvSpPr>
+        <p:spPr>
+          <a:xfrm>
+            <a:off x="685800" y="4400550"/>
+            <a:ext cx="5486400" cy="3600450"/>
+          </a:xfrm>
+          <a:prstGeom prst="rect">
+            <a:avLst/>
+          </a:prstGeom>
+        </p:spPr>
+        <p:txBody>
+          <a:bodyPr vert="horz" lIns="91440" tIns="45720" rIns="91440" bIns="45720" rtlCol="0"/>
+          <a:lstStyle/>
+          <a:p>
+            <a:pPr lvl="0"/>
+            <a:r>
+              <a:rPr lang="en-US" smtClean="0"/>
+              <a:t>Edit Master text styles</a:t>
+            </a:r>
+          </a:p>
+          <a:p>
+            <a:pPr lvl="1"/>
+            <a:r>
+              <a:rPr lang="en-US" smtClean="0"/>
+              <a:t>Second level</a:t>
+            </a:r>
+          </a:p>
+          <a:p>
+            <a:pPr lvl="2"/>
+            <a:r>
+              <a:rPr lang="en-US" smtClean="0"/>
+              <a:t>Third level</a:t>
+            </a:r>
+          </a:p>
+          <a:p>
+            <a:pPr lvl="3"/>
+            <a:r>
+              <a:rPr lang="en-US" smtClean="0"/>
+              <a:t>Fourth level</a:t>
+            </a:r>
+          </a:p>
+          <a:p>
+            <a:pPr lvl="4"/>
+            <a:r>
+              <a:rPr lang="en-US" smtClean="0"/>
+              <a:t>Fifth level</a:t>
+            </a:r>
+            <a:endParaRPr lang="en-US"/>
+          </a:p>
+        </p:txBody>
+      </p:sp>
+      <p:sp>
+        <p:nvSpPr>
+          <p:cNvPr id="6" name="Footer Placeholder 5"/>
+          <p:cNvSpPr>
+            <a:spLocks noGrp="1"/>
+          </p:cNvSpPr>
+          <p:nvPr>
+            <p:ph type="ftr" sz="quarter" idx="4"/>
+          </p:nvPr>
+        </p:nvSpPr>
+        <p:spPr>
+          <a:xfrm>
+            <a:off x="0" y="8685213"/>
+            <a:ext cx="2971800" cy="458787"/>
+          </a:xfrm>
+          <a:prstGeom prst="rect">
+            <a:avLst/>
+          </a:prstGeom>
+        </p:spPr>
+        <p:txBody>
+          <a:bodyPr vert="horz" lIns="91440" tIns="45720" rIns="91440" bIns="45720" rtlCol="0" anchor="b"/>
+          <a:lstStyle>
+            <a:lvl1pPr algn="l">
+              <a:defRPr sz="1200"/>
+            </a:lvl1pPr>
+          </a:lstStyle>
+          <a:p>
+            <a:endParaRPr lang="en-US"/>
+          </a:p>
+        </p:txBody>
+      </p:sp>
+      <p:sp>
+        <p:nvSpPr>
+          <p:cNvPr id="7" name="Slide Number Placeholder 6"/>
+          <p:cNvSpPr>
+            <a:spLocks noGrp="1"/>
+          </p:cNvSpPr>
+          <p:nvPr>
+            <p:ph type="sldNum" sz="quarter" idx="5"/>
+          </p:nvPr>
+        </p:nvSpPr>
+        <p:spPr>
+          <a:xfrm>
+            <a:off x="3884613" y="8685213"/>
+            <a:ext cx="2971800" cy="458787"/>
+          </a:xfrm>
+          <a:prstGeom prst="rect">
+            <a:avLst/>
+          </a:prstGeom>
+        </p:spPr>
+        <p:txBody>
+          <a:bodyPr vert="horz" lIns="91440" tIns="45720" rIns="91440" bIns="45720" rtlCol="0" anchor="b"/>
+          <a:lstStyle>
+            <a:lvl1pPr algn="r">
+              <a:defRPr sz="1200"/>
+            </a:lvl1pPr>
+          </a:lstStyle>
+          <a:p>
+            <a:fld id="{2FDC19FB-B5BF-4AF1-A018-EAD8D29F4C16}" type="slidenum">
+              <a:rPr lang="en-US" smtClean="0"/>
+              <a:t>‹#›</a:t>
+            </a:fld>
+            <a:endParaRPr lang="en-US"/>
+          </a:p>
+        </p:txBody>
+      </p:sp>
+    </p:spTree>
+    <p:extLst>
+      <p:ext uri="{BB962C8B-B14F-4D97-AF65-F5344CB8AC3E}">
+        <p14:creationId xmlns:p14="http://schemas.microsoft.com/office/powerpoint/2010/main" val="2942968570"/>
+      </p:ext>
+    </p:extLst>
+  </p:cSld>
+  <p:clrMap bg1="lt1" tx1="dk1" bg2="lt2" tx2="dk2" accent1="accent1" accent2="accent2" accent3="accent3" accent4="accent4" accent5="accent5" accent6="accent6" hlink="hlink" folHlink="folHlink"/>
+  <p:notesStyle>
+    <a:lvl1pPr marL="0" algn="l" defTabSz="914400" rtl="0" eaLnBrk="1" latinLnBrk="0" hangingPunct="1">
+      <a:defRPr sz="1200" kern="1200">
+        <a:solidFill>
+          <a:schemeClr val="tx1"/>
+        </a:solidFill>
+        <a:latin typeface="+mn-lt"/>
+        <a:ea typeface="+mn-ea"/>
+        <a:cs typeface="+mn-cs"/>
+      </a:defRPr>
+    </a:lvl1pPr>
+    <a:lvl2pPr marL="457200" algn="l" defTabSz="914400" rtl="0" eaLnBrk="1" latinLnBrk="0" hangingPunct="1">
+      <a:defRPr sz="1200" kern="1200">
+        <a:solidFill>
+          <a:schemeClr val="tx1"/>
+        </a:solidFill>
+        <a:latin typeface="+mn-lt"/>
+        <a:ea typeface="+mn-ea"/>
+        <a:cs typeface="+mn-cs"/>
+      </a:defRPr>
+    </a:lvl2pPr>
+    <a:lvl3pPr marL="914400" algn="l" defTabSz="914400" rtl="0" eaLnBrk="1" latinLnBrk="0" hangingPunct="1">
+      <a:defRPr sz="1200" kern="1200">
+        <a:solidFill>
+          <a:schemeClr val="tx1"/>
+        </a:solidFill>
+        <a:latin typeface="+mn-lt"/>
+        <a:ea typeface="+mn-ea"/>
+        <a:cs typeface="+mn-cs"/>
+      </a:defRPr>
+    </a:lvl3pPr>
+    <a:lvl4pPr marL="1371600" algn="l" defTabSz="914400" rtl="0" eaLnBrk="1" latinLnBrk="0" hangingPunct="1">
+      <a:defRPr sz="1200" kern="1200">
+        <a:solidFill>
+          <a:schemeClr val="tx1"/>
+        </a:solidFill>
+        <a:latin typeface="+mn-lt"/>
+        <a:ea typeface="+mn-ea"/>
+        <a:cs typeface="+mn-cs"/>
+      </a:defRPr>
+    </a:lvl4pPr>
+    <a:lvl5pPr marL="1828800" algn="l" defTabSz="914400" rtl="0" eaLnBrk="1" latinLnBrk="0" hangingPunct="1">
+      <a:defRPr sz="1200" kern="1200">
+        <a:solidFill>
+          <a:schemeClr val="tx1"/>
+        </a:solidFill>
+        <a:latin typeface="+mn-lt"/>
+        <a:ea typeface="+mn-ea"/>
+        <a:cs typeface="+mn-cs"/>
+      </a:defRPr>
+    </a:lvl5pPr>
+    <a:lvl6pPr marL="2286000" algn="l" defTabSz="914400" rtl="0" eaLnBrk="1" latinLnBrk="0" hangingPunct="1">
+      <a:defRPr sz="1200" kern="1200">
+        <a:solidFill>
+          <a:schemeClr val="tx1"/>
+        </a:solidFill>
+        <a:latin typeface="+mn-lt"/>
+        <a:ea typeface="+mn-ea"/>
+        <a:cs typeface="+mn-cs"/>
+      </a:defRPr>
+    </a:lvl6pPr>
+    <a:lvl7pPr marL="2743200" algn="l" defTabSz="914400" rtl="0" eaLnBrk="1" latinLnBrk="0" hangingPunct="1">
+      <a:defRPr sz="1200" kern="1200">
+        <a:solidFill>
+          <a:schemeClr val="tx1"/>
+        </a:solidFill>
+        <a:latin typeface="+mn-lt"/>
+        <a:ea typeface="+mn-ea"/>
+        <a:cs typeface="+mn-cs"/>
+      </a:defRPr>
+    </a:lvl7pPr>
+    <a:lvl8pPr marL="3200400" algn="l" defTabSz="914400" rtl="0" eaLnBrk="1" latinLnBrk="0" hangingPunct="1">
+      <a:defRPr sz="1200" kern="1200">
+        <a:solidFill>
+          <a:schemeClr val="tx1"/>
+        </a:solidFill>
+        <a:latin typeface="+mn-lt"/>
+        <a:ea typeface="+mn-ea"/>
+        <a:cs typeface="+mn-cs"/>
+      </a:defRPr>
+    </a:lvl8pPr>
+    <a:lvl9pPr marL="3657600" algn="l" defTabSz="914400" rtl="0" eaLnBrk="1" latinLnBrk="0" hangingPunct="1">
+      <a:defRPr sz="1200" kern="1200">
+        <a:solidFill>
+          <a:schemeClr val="tx1"/>
+        </a:solidFill>
+        <a:latin typeface="+mn-lt"/>
+        <a:ea typeface="+mn-ea"/>
+        <a:cs typeface="+mn-cs"/>
+      </a:defRPr>
+    </a:lvl9pPr>
+  </p:notesStyle>
+</p:notesMaster>
+</file>
+
+<file path=ppt/notesSlides/notesSlide1.xml><?xml version="1.0" encoding="utf-8"?>
+<p:notes xmlns:a="http://schemas.openxmlformats.org/drawingml/2006/main" xmlns:r="http://schemas.openxmlformats.org/officeDocument/2006/relationships" xmlns:p="http://schemas.openxmlformats.org/presentationml/2006/main">
+  <p:cSld>
+    <p:spTree>
+      <p:nvGrpSpPr>
+        <p:cNvPr id="1" name=""/>
+        <p:cNvGrpSpPr/>
+        <p:nvPr/>
+      </p:nvGrpSpPr>
+      <p:grpSpPr>
+        <a:xfrm>
+          <a:off x="0" y="0"/>
+          <a:ext cx="0" cy="0"/>
+          <a:chOff x="0" y="0"/>
+          <a:chExt cx="0" cy="0"/>
+        </a:xfrm>
+      </p:grpSpPr>
+      <p:sp>
+        <p:nvSpPr>
+          <p:cNvPr id="2" name="Slide Image Placeholder 1"/>
+          <p:cNvSpPr>
+            <a:spLocks noGrp="1" noRot="1" noChangeAspect="1"/>
+          </p:cNvSpPr>
+          <p:nvPr>
+            <p:ph type="sldImg"/>
+          </p:nvPr>
+        </p:nvSpPr>
+        <p:spPr/>
+      </p:sp>
+      <p:sp>
+        <p:nvSpPr>
+          <p:cNvPr id="3" name="Notes Placeholder 2"/>
+          <p:cNvSpPr>
+            <a:spLocks noGrp="1"/>
+          </p:cNvSpPr>
+          <p:nvPr>
+            <p:ph type="body" idx="1"/>
+          </p:nvPr>
+        </p:nvSpPr>
+        <p:spPr/>
+        <p:txBody>
+          <a:bodyPr/>
+          <a:lstStyle/>
+          <a:p>
+            <a:r>
+              <a:rPr lang="en-US" dirty="0" smtClean="0"/>
+              <a:t>Aquatic habitat uplift</a:t>
+            </a:r>
+            <a:endParaRPr lang="en-US" dirty="0"/>
+          </a:p>
+        </p:txBody>
+      </p:sp>
+      <p:sp>
+        <p:nvSpPr>
+          <p:cNvPr id="4" name="Slide Number Placeholder 3"/>
+          <p:cNvSpPr>
+            <a:spLocks noGrp="1"/>
+          </p:cNvSpPr>
+          <p:nvPr>
+            <p:ph type="sldNum" sz="quarter" idx="10"/>
+          </p:nvPr>
+        </p:nvSpPr>
+        <p:spPr/>
+        <p:txBody>
+          <a:bodyPr/>
+          <a:lstStyle/>
+          <a:p>
+            <a:fld id="{2FDC19FB-B5BF-4AF1-A018-EAD8D29F4C16}" type="slidenum">
+              <a:rPr lang="en-US" smtClean="0"/>
+              <a:t>3</a:t>
+            </a:fld>
+            <a:endParaRPr lang="en-US"/>
+          </a:p>
+        </p:txBody>
+      </p:sp>
+    </p:spTree>
+    <p:extLst>
+      <p:ext uri="{BB962C8B-B14F-4D97-AF65-F5344CB8AC3E}">
+        <p14:creationId xmlns:p14="http://schemas.microsoft.com/office/powerpoint/2010/main" val="1691603921"/>
+      </p:ext>
+    </p:extLst>
+  </p:cSld>
+  <p:clrMapOvr>
+    <a:masterClrMapping/>
+  </p:clrMapOvr>
+</p:notes>
 </file>
 
 <file path=ppt/slideLayouts/slideLayout1.xml><?xml version="1.0" encoding="utf-8"?>
@@ -240,7 +713,7 @@
           <a:p>
             <a:fld id="{E4657354-A55A-4A62-BC37-84652271ECE7}" type="datetimeFigureOut">
               <a:rPr lang="en-US" smtClean="0"/>
-              <a:t>6/9/2016</a:t>
+              <a:t>6/14/2016</a:t>
             </a:fld>
             <a:endParaRPr lang="en-US"/>
           </a:p>
@@ -410,7 +883,7 @@
           <a:p>
             <a:fld id="{E4657354-A55A-4A62-BC37-84652271ECE7}" type="datetimeFigureOut">
               <a:rPr lang="en-US" smtClean="0"/>
-              <a:t>6/9/2016</a:t>
+              <a:t>6/14/2016</a:t>
             </a:fld>
             <a:endParaRPr lang="en-US"/>
           </a:p>
@@ -590,7 +1063,7 @@
           <a:p>
             <a:fld id="{E4657354-A55A-4A62-BC37-84652271ECE7}" type="datetimeFigureOut">
               <a:rPr lang="en-US" smtClean="0"/>
-              <a:t>6/9/2016</a:t>
+              <a:t>6/14/2016</a:t>
             </a:fld>
             <a:endParaRPr lang="en-US"/>
           </a:p>
@@ -760,7 +1233,7 @@
           <a:p>
             <a:fld id="{E4657354-A55A-4A62-BC37-84652271ECE7}" type="datetimeFigureOut">
               <a:rPr lang="en-US" smtClean="0"/>
-              <a:t>6/9/2016</a:t>
+              <a:t>6/14/2016</a:t>
             </a:fld>
             <a:endParaRPr lang="en-US"/>
           </a:p>
@@ -1006,7 +1479,7 @@
           <a:p>
             <a:fld id="{E4657354-A55A-4A62-BC37-84652271ECE7}" type="datetimeFigureOut">
               <a:rPr lang="en-US" smtClean="0"/>
-              <a:t>6/9/2016</a:t>
+              <a:t>6/14/2016</a:t>
             </a:fld>
             <a:endParaRPr lang="en-US"/>
           </a:p>
@@ -1238,7 +1711,7 @@
           <a:p>
             <a:fld id="{E4657354-A55A-4A62-BC37-84652271ECE7}" type="datetimeFigureOut">
               <a:rPr lang="en-US" smtClean="0"/>
-              <a:t>6/9/2016</a:t>
+              <a:t>6/14/2016</a:t>
             </a:fld>
             <a:endParaRPr lang="en-US"/>
           </a:p>
@@ -1605,7 +2078,7 @@
           <a:p>
             <a:fld id="{E4657354-A55A-4A62-BC37-84652271ECE7}" type="datetimeFigureOut">
               <a:rPr lang="en-US" smtClean="0"/>
-              <a:t>6/9/2016</a:t>
+              <a:t>6/14/2016</a:t>
             </a:fld>
             <a:endParaRPr lang="en-US"/>
           </a:p>
@@ -1723,7 +2196,7 @@
           <a:p>
             <a:fld id="{E4657354-A55A-4A62-BC37-84652271ECE7}" type="datetimeFigureOut">
               <a:rPr lang="en-US" smtClean="0"/>
-              <a:t>6/9/2016</a:t>
+              <a:t>6/14/2016</a:t>
             </a:fld>
             <a:endParaRPr lang="en-US"/>
           </a:p>
@@ -1818,7 +2291,7 @@
           <a:p>
             <a:fld id="{E4657354-A55A-4A62-BC37-84652271ECE7}" type="datetimeFigureOut">
               <a:rPr lang="en-US" smtClean="0"/>
-              <a:t>6/9/2016</a:t>
+              <a:t>6/14/2016</a:t>
             </a:fld>
             <a:endParaRPr lang="en-US"/>
           </a:p>
@@ -2095,7 +2568,7 @@
           <a:p>
             <a:fld id="{E4657354-A55A-4A62-BC37-84652271ECE7}" type="datetimeFigureOut">
               <a:rPr lang="en-US" smtClean="0"/>
-              <a:t>6/9/2016</a:t>
+              <a:t>6/14/2016</a:t>
             </a:fld>
             <a:endParaRPr lang="en-US"/>
           </a:p>
@@ -2348,7 +2821,7 @@
           <a:p>
             <a:fld id="{E4657354-A55A-4A62-BC37-84652271ECE7}" type="datetimeFigureOut">
               <a:rPr lang="en-US" smtClean="0"/>
-              <a:t>6/9/2016</a:t>
+              <a:t>6/14/2016</a:t>
             </a:fld>
             <a:endParaRPr lang="en-US"/>
           </a:p>
@@ -2561,7 +3034,7 @@
           <a:p>
             <a:fld id="{E4657354-A55A-4A62-BC37-84652271ECE7}" type="datetimeFigureOut">
               <a:rPr lang="en-US" smtClean="0"/>
-              <a:t>6/9/2016</a:t>
+              <a:t>6/14/2016</a:t>
             </a:fld>
             <a:endParaRPr lang="en-US"/>
           </a:p>
@@ -3095,15 +3568,7 @@
             </a:pPr>
             <a:r>
               <a:rPr lang="en-US" dirty="0" smtClean="0"/>
-              <a:t>Download regional </a:t>
-            </a:r>
-            <a:r>
-              <a:rPr lang="en-US" dirty="0" err="1" smtClean="0"/>
-              <a:t>StreamCat</a:t>
-            </a:r>
-            <a:r>
-              <a:rPr lang="en-US" dirty="0" smtClean="0"/>
-              <a:t> data files</a:t>
+              <a:t>Download regional StreamCat data files</a:t>
             </a:r>
           </a:p>
           <a:p>
@@ -3145,15 +3610,7 @@
             </a:r>
             <a:r>
               <a:rPr lang="en-US" dirty="0" smtClean="0"/>
-              <a:t>to combined files across regions into single </a:t>
-            </a:r>
-            <a:r>
-              <a:rPr lang="en-US" dirty="0" err="1" smtClean="0"/>
-              <a:t>StreamCat</a:t>
-            </a:r>
-            <a:r>
-              <a:rPr lang="en-US" dirty="0" smtClean="0"/>
-              <a:t> csv files</a:t>
+              <a:t>to combined files across regions into single StreamCat csv files</a:t>
             </a:r>
           </a:p>
           <a:p>
@@ -4127,18 +4584,22 @@
       </p:grpSpPr>
       <p:sp>
         <p:nvSpPr>
-          <p:cNvPr id="5" name="Rounded Rectangle 4"/>
+          <p:cNvPr id="135" name="Rounded Rectangle 134"/>
           <p:cNvSpPr/>
           <p:nvPr/>
         </p:nvSpPr>
         <p:spPr>
           <a:xfrm>
-            <a:off x="470779" y="461727"/>
-            <a:ext cx="1403287" cy="878186"/>
+            <a:off x="565646" y="1170604"/>
+            <a:ext cx="2464453" cy="5591440"/>
           </a:xfrm>
           <a:prstGeom prst="roundRect">
             <a:avLst/>
           </a:prstGeom>
+          <a:noFill/>
+          <a:ln>
+            <a:prstDash val="dash"/>
+          </a:ln>
         </p:spPr>
         <p:style>
           <a:lnRef idx="2">
@@ -4161,28 +4622,27 @@
           <a:lstStyle/>
           <a:p>
             <a:pPr algn="ctr"/>
-            <a:r>
-              <a:rPr lang="en-US" dirty="0" smtClean="0"/>
-              <a:t>Species Presences CSV file</a:t>
-            </a:r>
-            <a:endParaRPr lang="en-US" dirty="0"/>
-          </a:p>
-        </p:txBody>
-      </p:sp>
-      <p:sp>
-        <p:nvSpPr>
-          <p:cNvPr id="6" name="Round Same Side Corner Rectangle 5"/>
+            <a:endParaRPr lang="en-US"/>
+          </a:p>
+        </p:txBody>
+      </p:sp>
+      <p:sp>
+        <p:nvSpPr>
+          <p:cNvPr id="5" name="Rounded Rectangle 4"/>
           <p:cNvSpPr/>
           <p:nvPr/>
         </p:nvSpPr>
         <p:spPr>
           <a:xfrm>
-            <a:off x="4507549" y="2011991"/>
-            <a:ext cx="1230502" cy="653925"/>
-          </a:xfrm>
-          <a:prstGeom prst="round2SameRect">
+            <a:off x="212841" y="222523"/>
+            <a:ext cx="1403287" cy="689918"/>
+          </a:xfrm>
+          <a:prstGeom prst="roundRect">
             <a:avLst/>
           </a:prstGeom>
+          <a:solidFill>
+            <a:srgbClr val="002060"/>
+          </a:solidFill>
         </p:spPr>
         <p:style>
           <a:lnRef idx="2">
@@ -4207,6 +4667,54 @@
             <a:pPr algn="ctr"/>
             <a:r>
               <a:rPr lang="en-US" sz="1200" dirty="0" smtClean="0"/>
+              <a:t>Aq. Species </a:t>
+            </a:r>
+            <a:r>
+              <a:rPr lang="en-US" sz="1200" dirty="0" smtClean="0"/>
+              <a:t>Presences CSV file</a:t>
+            </a:r>
+            <a:endParaRPr lang="en-US" sz="1200" dirty="0"/>
+          </a:p>
+        </p:txBody>
+      </p:sp>
+      <p:sp>
+        <p:nvSpPr>
+          <p:cNvPr id="6" name="Round Same Side Corner Rectangle 5"/>
+          <p:cNvSpPr/>
+          <p:nvPr/>
+        </p:nvSpPr>
+        <p:spPr>
+          <a:xfrm>
+            <a:off x="3829852" y="2609589"/>
+            <a:ext cx="1230502" cy="653925"/>
+          </a:xfrm>
+          <a:prstGeom prst="round2SameRect">
+            <a:avLst/>
+          </a:prstGeom>
+        </p:spPr>
+        <p:style>
+          <a:lnRef idx="2">
+            <a:schemeClr val="accent1">
+              <a:shade val="50000"/>
+            </a:schemeClr>
+          </a:lnRef>
+          <a:fillRef idx="1">
+            <a:schemeClr val="accent1"/>
+          </a:fillRef>
+          <a:effectRef idx="0">
+            <a:schemeClr val="accent1"/>
+          </a:effectRef>
+          <a:fontRef idx="minor">
+            <a:schemeClr val="lt1"/>
+          </a:fontRef>
+        </p:style>
+        <p:txBody>
+          <a:bodyPr rtlCol="0" anchor="ctr"/>
+          <a:lstStyle/>
+          <a:p>
+            <a:pPr algn="ctr"/>
+            <a:r>
+              <a:rPr lang="en-US" sz="1200" dirty="0" smtClean="0"/>
               <a:t>Modified</a:t>
             </a:r>
           </a:p>
@@ -4235,7 +4743,7 @@
         </p:nvSpPr>
         <p:spPr>
           <a:xfrm>
-            <a:off x="3054624" y="2024948"/>
+            <a:off x="3199432" y="1665346"/>
             <a:ext cx="1158406" cy="648031"/>
           </a:xfrm>
           <a:prstGeom prst="ellipse">
@@ -4264,10 +4772,26 @@
           <a:p>
             <a:pPr algn="ctr"/>
             <a:r>
-              <a:rPr lang="en-US" sz="1400" dirty="0" smtClean="0"/>
-              <a:t>GIS Tool</a:t>
-            </a:r>
-            <a:endParaRPr lang="en-US" sz="1400" dirty="0"/>
+              <a:rPr lang="en-US" sz="1200" dirty="0" smtClean="0">
+                <a:solidFill>
+                  <a:schemeClr val="tx1"/>
+                </a:solidFill>
+              </a:rPr>
+              <a:t>GIS </a:t>
+            </a:r>
+            <a:r>
+              <a:rPr lang="en-US" sz="1200" dirty="0" smtClean="0">
+                <a:solidFill>
+                  <a:schemeClr val="tx1"/>
+                </a:solidFill>
+              </a:rPr>
+              <a:t>Tool</a:t>
+            </a:r>
+            <a:endParaRPr lang="en-US" sz="1200" dirty="0">
+              <a:solidFill>
+                <a:schemeClr val="tx1"/>
+              </a:solidFill>
+            </a:endParaRPr>
           </a:p>
         </p:txBody>
       </p:sp>
@@ -4276,14 +4800,14 @@
           <p:cNvPr id="9" name="Straight Arrow Connector 8"/>
           <p:cNvCxnSpPr>
             <a:stCxn id="79" idx="2"/>
-            <a:endCxn id="7" idx="0"/>
+            <a:endCxn id="7" idx="1"/>
           </p:cNvCxnSpPr>
           <p:nvPr/>
         </p:nvCxnSpPr>
         <p:spPr>
           <a:xfrm>
-            <a:off x="3569470" y="1390428"/>
-            <a:ext cx="64357" cy="634520"/>
+            <a:off x="2967698" y="1008596"/>
+            <a:ext cx="401379" cy="751652"/>
           </a:xfrm>
           <a:prstGeom prst="straightConnector1">
             <a:avLst/>
@@ -4311,15 +4835,15 @@
         <p:nvCxnSpPr>
           <p:cNvPr id="11" name="Straight Arrow Connector 10"/>
           <p:cNvCxnSpPr>
-            <a:stCxn id="7" idx="6"/>
-            <a:endCxn id="6" idx="2"/>
+            <a:stCxn id="7" idx="5"/>
+            <a:endCxn id="6" idx="3"/>
           </p:cNvCxnSpPr>
           <p:nvPr/>
         </p:nvCxnSpPr>
         <p:spPr>
-          <a:xfrm flipV="1">
-            <a:off x="4213030" y="2338954"/>
-            <a:ext cx="294519" cy="10010"/>
+          <a:xfrm>
+            <a:off x="4188193" y="2218475"/>
+            <a:ext cx="256910" cy="391114"/>
           </a:xfrm>
           <a:prstGeom prst="straightConnector1">
             <a:avLst/>
@@ -4351,8 +4875,8 @@
         </p:nvSpPr>
         <p:spPr>
           <a:xfrm>
-            <a:off x="1222583" y="2111529"/>
-            <a:ext cx="1270072" cy="705734"/>
+            <a:off x="855005" y="2414032"/>
+            <a:ext cx="1821366" cy="962178"/>
           </a:xfrm>
           <a:prstGeom prst="ellipse">
             <a:avLst/>
@@ -4380,23 +4904,50 @@
           <a:p>
             <a:pPr algn="ctr"/>
             <a:r>
-              <a:rPr lang="en-US" sz="1400" dirty="0" smtClean="0"/>
-              <a:t>Extract Species Data</a:t>
-            </a:r>
-            <a:endParaRPr lang="en-US" sz="1400" dirty="0"/>
+              <a:rPr lang="en-US" sz="1200" dirty="0" smtClean="0">
+                <a:solidFill>
+                  <a:schemeClr val="tx1"/>
+                </a:solidFill>
+              </a:rPr>
+              <a:t>Extract </a:t>
+            </a:r>
+            <a:r>
+              <a:rPr lang="en-US" sz="1200" dirty="0" smtClean="0">
+                <a:solidFill>
+                  <a:schemeClr val="tx1"/>
+                </a:solidFill>
+              </a:rPr>
+              <a:t>Species </a:t>
+            </a:r>
+            <a:r>
+              <a:rPr lang="en-US" sz="1200" dirty="0" smtClean="0">
+                <a:solidFill>
+                  <a:schemeClr val="tx1"/>
+                </a:solidFill>
+              </a:rPr>
+              <a:t>Data &amp; create MaxEnt SWD File</a:t>
+            </a:r>
+            <a:endParaRPr lang="en-US" sz="1200" dirty="0">
+              <a:solidFill>
+                <a:schemeClr val="tx1"/>
+              </a:solidFill>
+            </a:endParaRPr>
           </a:p>
         </p:txBody>
       </p:sp>
       <p:cxnSp>
         <p:nvCxnSpPr>
           <p:cNvPr id="26" name="Straight Arrow Connector 25"/>
-          <p:cNvCxnSpPr/>
+          <p:cNvCxnSpPr>
+            <a:stCxn id="22" idx="4"/>
+            <a:endCxn id="77" idx="3"/>
+          </p:cNvCxnSpPr>
           <p:nvPr/>
         </p:nvCxnSpPr>
         <p:spPr>
-          <a:xfrm flipH="1">
-            <a:off x="2549496" y="2665916"/>
-            <a:ext cx="887496" cy="655560"/>
+          <a:xfrm>
+            <a:off x="1765688" y="3376210"/>
+            <a:ext cx="0" cy="1125559"/>
           </a:xfrm>
           <a:prstGeom prst="straightConnector1">
             <a:avLst/>
@@ -4422,93 +4973,13 @@
       </p:cxnSp>
       <p:sp>
         <p:nvSpPr>
-          <p:cNvPr id="48" name="Oval 47"/>
-          <p:cNvSpPr/>
-          <p:nvPr/>
-        </p:nvSpPr>
-        <p:spPr>
-          <a:xfrm>
-            <a:off x="1222583" y="3170130"/>
-            <a:ext cx="1270072" cy="705734"/>
-          </a:xfrm>
-          <a:prstGeom prst="ellipse">
-            <a:avLst/>
-          </a:prstGeom>
-        </p:spPr>
-        <p:style>
-          <a:lnRef idx="2">
-            <a:schemeClr val="accent4">
-              <a:shade val="50000"/>
-            </a:schemeClr>
-          </a:lnRef>
-          <a:fillRef idx="1">
-            <a:schemeClr val="accent4"/>
-          </a:fillRef>
-          <a:effectRef idx="0">
-            <a:schemeClr val="accent4"/>
-          </a:effectRef>
-          <a:fontRef idx="minor">
-            <a:schemeClr val="lt1"/>
-          </a:fontRef>
-        </p:style>
-        <p:txBody>
-          <a:bodyPr rtlCol="0" anchor="ctr"/>
-          <a:lstStyle/>
-          <a:p>
-            <a:pPr algn="ctr"/>
-            <a:r>
-              <a:rPr lang="en-US" sz="1400" dirty="0" smtClean="0"/>
-              <a:t>Prep SWD file</a:t>
-            </a:r>
-            <a:endParaRPr lang="en-US" sz="1400" dirty="0"/>
-          </a:p>
-        </p:txBody>
-      </p:sp>
-      <p:cxnSp>
-        <p:nvCxnSpPr>
-          <p:cNvPr id="50" name="Straight Arrow Connector 49"/>
-          <p:cNvCxnSpPr>
-            <a:stCxn id="22" idx="4"/>
-            <a:endCxn id="48" idx="0"/>
-          </p:cNvCxnSpPr>
-          <p:nvPr/>
-        </p:nvCxnSpPr>
-        <p:spPr>
-          <a:xfrm>
-            <a:off x="1857619" y="2817263"/>
-            <a:ext cx="0" cy="352867"/>
-          </a:xfrm>
-          <a:prstGeom prst="straightConnector1">
-            <a:avLst/>
-          </a:prstGeom>
-          <a:ln>
-            <a:tailEnd type="triangle"/>
-          </a:ln>
-        </p:spPr>
-        <p:style>
-          <a:lnRef idx="1">
-            <a:schemeClr val="accent1"/>
-          </a:lnRef>
-          <a:fillRef idx="0">
-            <a:schemeClr val="accent1"/>
-          </a:fillRef>
-          <a:effectRef idx="0">
-            <a:schemeClr val="accent1"/>
-          </a:effectRef>
-          <a:fontRef idx="minor">
-            <a:schemeClr val="tx1"/>
-          </a:fontRef>
-        </p:style>
-      </p:cxnSp>
-      <p:sp>
-        <p:nvSpPr>
           <p:cNvPr id="77" name="Round Same Side Corner Rectangle 76"/>
           <p:cNvSpPr/>
           <p:nvPr/>
         </p:nvSpPr>
         <p:spPr>
           <a:xfrm>
-            <a:off x="3655862" y="3849710"/>
+            <a:off x="1150437" y="4501769"/>
             <a:ext cx="1230502" cy="653925"/>
           </a:xfrm>
           <a:prstGeom prst="round2SameRect">
@@ -4538,21 +5009,7 @@
             <a:pPr algn="ctr"/>
             <a:r>
               <a:rPr lang="en-US" sz="1200" dirty="0" smtClean="0"/>
-              <a:t>Modified</a:t>
-            </a:r>
-          </a:p>
-          <a:p>
-            <a:pPr algn="ctr"/>
-            <a:r>
-              <a:rPr lang="en-US" sz="1200" dirty="0" smtClean="0"/>
-              <a:t>Stream Cat</a:t>
-            </a:r>
-          </a:p>
-          <a:p>
-            <a:pPr algn="ctr"/>
-            <a:r>
-              <a:rPr lang="en-US" sz="1200" dirty="0" smtClean="0"/>
-              <a:t>CSV files</a:t>
+              <a:t>Maxent SWD file</a:t>
             </a:r>
             <a:endParaRPr lang="en-US" sz="1200" dirty="0"/>
           </a:p>
@@ -4566,11 +5023,14 @@
         </p:nvGrpSpPr>
         <p:grpSpPr>
           <a:xfrm>
-            <a:off x="2809743" y="348761"/>
-            <a:ext cx="1461370" cy="1041667"/>
-            <a:chOff x="2703223" y="345474"/>
-            <a:chExt cx="1461370" cy="1041667"/>
-          </a:xfrm>
+            <a:off x="2174920" y="190245"/>
+            <a:ext cx="1494421" cy="818351"/>
+            <a:chOff x="2670172" y="345474"/>
+            <a:chExt cx="1494421" cy="1041667"/>
+          </a:xfrm>
+          <a:solidFill>
+            <a:srgbClr val="002060"/>
+          </a:solidFill>
         </p:grpSpPr>
         <p:sp>
           <p:nvSpPr>
@@ -4586,6 +5046,7 @@
             <a:prstGeom prst="roundRect">
               <a:avLst/>
             </a:prstGeom>
+            <a:grpFill/>
           </p:spPr>
           <p:style>
             <a:lnRef idx="2">
@@ -4609,17 +5070,17 @@
             <a:p>
               <a:pPr algn="ctr"/>
               <a:r>
-                <a:rPr lang="en-US" dirty="0" smtClean="0"/>
+                <a:rPr lang="en-US" sz="1200" dirty="0" smtClean="0"/>
                 <a:t>Stream Cat</a:t>
               </a:r>
             </a:p>
             <a:p>
               <a:pPr algn="ctr"/>
               <a:r>
-                <a:rPr lang="en-US" dirty="0" smtClean="0"/>
+                <a:rPr lang="en-US" sz="1200" dirty="0" smtClean="0"/>
                 <a:t>CSV files</a:t>
               </a:r>
-              <a:endParaRPr lang="en-US" dirty="0"/>
+              <a:endParaRPr lang="en-US" sz="1200" dirty="0"/>
             </a:p>
           </p:txBody>
         </p:sp>
@@ -4631,12 +5092,13 @@
           </p:nvSpPr>
           <p:spPr>
             <a:xfrm>
-              <a:off x="2712330" y="418531"/>
+              <a:off x="2723347" y="429548"/>
               <a:ext cx="1403287" cy="878186"/>
             </a:xfrm>
             <a:prstGeom prst="roundRect">
               <a:avLst/>
             </a:prstGeom>
+            <a:grpFill/>
           </p:spPr>
           <p:style>
             <a:lnRef idx="2">
@@ -4660,17 +5122,17 @@
             <a:p>
               <a:pPr algn="ctr"/>
               <a:r>
-                <a:rPr lang="en-US" dirty="0" smtClean="0"/>
+                <a:rPr lang="en-US" sz="1200" dirty="0" smtClean="0"/>
                 <a:t>Stream Cat</a:t>
               </a:r>
             </a:p>
             <a:p>
               <a:pPr algn="ctr"/>
               <a:r>
-                <a:rPr lang="en-US" dirty="0" smtClean="0"/>
+                <a:rPr lang="en-US" sz="1200" dirty="0" smtClean="0"/>
                 <a:t>CSV files</a:t>
               </a:r>
-              <a:endParaRPr lang="en-US" dirty="0"/>
+              <a:endParaRPr lang="en-US" sz="1200" dirty="0"/>
             </a:p>
           </p:txBody>
         </p:sp>
@@ -4682,12 +5144,13 @@
           </p:nvSpPr>
           <p:spPr>
             <a:xfrm>
-              <a:off x="2703223" y="345474"/>
+              <a:off x="2670172" y="345474"/>
               <a:ext cx="1403287" cy="878186"/>
             </a:xfrm>
             <a:prstGeom prst="roundRect">
               <a:avLst/>
             </a:prstGeom>
+            <a:grpFill/>
           </p:spPr>
           <p:style>
             <a:lnRef idx="2">
@@ -4711,17 +5174,17 @@
             <a:p>
               <a:pPr algn="ctr"/>
               <a:r>
-                <a:rPr lang="en-US" dirty="0" smtClean="0"/>
+                <a:rPr lang="en-US" sz="1200" dirty="0" smtClean="0"/>
                 <a:t>Stream Cat</a:t>
               </a:r>
             </a:p>
             <a:p>
               <a:pPr algn="ctr"/>
               <a:r>
-                <a:rPr lang="en-US" dirty="0" smtClean="0"/>
+                <a:rPr lang="en-US" sz="1200" dirty="0" smtClean="0"/>
                 <a:t>CSV files</a:t>
               </a:r>
-              <a:endParaRPr lang="en-US" dirty="0"/>
+              <a:endParaRPr lang="en-US" sz="1200" dirty="0"/>
             </a:p>
           </p:txBody>
         </p:sp>
@@ -4737,11 +5200,13 @@
         </p:nvCxnSpPr>
         <p:spPr>
           <a:xfrm rot="5400000">
-            <a:off x="2525838" y="1171248"/>
-            <a:ext cx="824453" cy="1262813"/>
+            <a:off x="1915496" y="1502738"/>
+            <a:ext cx="1546344" cy="558060"/>
           </a:xfrm>
           <a:prstGeom prst="bentConnector3">
-            <a:avLst/>
+            <a:avLst>
+              <a:gd name="adj1" fmla="val 50000"/>
+            </a:avLst>
           </a:prstGeom>
           <a:ln>
             <a:tailEnd type="triangle"/>
@@ -4773,8 +5238,8 @@
         </p:nvCxnSpPr>
         <p:spPr>
           <a:xfrm rot="16200000" flipH="1">
-            <a:off x="853018" y="1659318"/>
-            <a:ext cx="874968" cy="236158"/>
+            <a:off x="196862" y="1630063"/>
+            <a:ext cx="1642499" cy="207253"/>
           </a:xfrm>
           <a:prstGeom prst="bentConnector3">
             <a:avLst>
@@ -4800,10 +5265,1710 @@
           </a:fontRef>
         </p:style>
       </p:cxnSp>
+      <p:sp>
+        <p:nvSpPr>
+          <p:cNvPr id="12" name="Rectangle 11"/>
+          <p:cNvSpPr/>
+          <p:nvPr/>
+        </p:nvSpPr>
+        <p:spPr>
+          <a:xfrm>
+            <a:off x="4206367" y="1270525"/>
+            <a:ext cx="944048" cy="307295"/>
+          </a:xfrm>
+          <a:prstGeom prst="rect">
+            <a:avLst/>
+          </a:prstGeom>
+        </p:spPr>
+        <p:style>
+          <a:lnRef idx="2">
+            <a:schemeClr val="accent2">
+              <a:shade val="50000"/>
+            </a:schemeClr>
+          </a:lnRef>
+          <a:fillRef idx="1">
+            <a:schemeClr val="accent2"/>
+          </a:fillRef>
+          <a:effectRef idx="0">
+            <a:schemeClr val="accent2"/>
+          </a:effectRef>
+          <a:fontRef idx="minor">
+            <a:schemeClr val="lt1"/>
+          </a:fontRef>
+        </p:style>
+        <p:txBody>
+          <a:bodyPr rtlCol="0" anchor="ctr"/>
+          <a:lstStyle/>
+          <a:p>
+            <a:pPr algn="ctr"/>
+            <a:r>
+              <a:rPr lang="en-US" sz="1400" b="1" dirty="0" smtClean="0"/>
+              <a:t>Scenario</a:t>
+            </a:r>
+            <a:endParaRPr lang="en-US" sz="1400" b="1" dirty="0"/>
+          </a:p>
+        </p:txBody>
+      </p:sp>
+      <p:cxnSp>
+        <p:nvCxnSpPr>
+          <p:cNvPr id="14" name="Straight Arrow Connector 13"/>
+          <p:cNvCxnSpPr>
+            <a:stCxn id="12" idx="2"/>
+            <a:endCxn id="7" idx="7"/>
+          </p:cNvCxnSpPr>
+          <p:nvPr/>
+        </p:nvCxnSpPr>
+        <p:spPr>
+          <a:xfrm flipH="1">
+            <a:off x="4188193" y="1577820"/>
+            <a:ext cx="490198" cy="182428"/>
+          </a:xfrm>
+          <a:prstGeom prst="straightConnector1">
+            <a:avLst/>
+          </a:prstGeom>
+          <a:ln>
+            <a:tailEnd type="triangle"/>
+          </a:ln>
+        </p:spPr>
+        <p:style>
+          <a:lnRef idx="1">
+            <a:schemeClr val="accent1"/>
+          </a:lnRef>
+          <a:fillRef idx="0">
+            <a:schemeClr val="accent1"/>
+          </a:fillRef>
+          <a:effectRef idx="0">
+            <a:schemeClr val="accent1"/>
+          </a:effectRef>
+          <a:fontRef idx="minor">
+            <a:schemeClr val="tx1"/>
+          </a:fontRef>
+        </p:style>
+      </p:cxnSp>
+      <p:sp>
+        <p:nvSpPr>
+          <p:cNvPr id="44" name="Round Same Side Corner Rectangle 43"/>
+          <p:cNvSpPr/>
+          <p:nvPr/>
+        </p:nvSpPr>
+        <p:spPr>
+          <a:xfrm>
+            <a:off x="3829852" y="4501769"/>
+            <a:ext cx="1230502" cy="653925"/>
+          </a:xfrm>
+          <a:prstGeom prst="round2SameRect">
+            <a:avLst/>
+          </a:prstGeom>
+        </p:spPr>
+        <p:style>
+          <a:lnRef idx="2">
+            <a:schemeClr val="accent1">
+              <a:shade val="50000"/>
+            </a:schemeClr>
+          </a:lnRef>
+          <a:fillRef idx="1">
+            <a:schemeClr val="accent1"/>
+          </a:fillRef>
+          <a:effectRef idx="0">
+            <a:schemeClr val="accent1"/>
+          </a:effectRef>
+          <a:fontRef idx="minor">
+            <a:schemeClr val="lt1"/>
+          </a:fontRef>
+        </p:style>
+        <p:txBody>
+          <a:bodyPr rtlCol="0" anchor="ctr"/>
+          <a:lstStyle/>
+          <a:p>
+            <a:pPr algn="ctr"/>
+            <a:r>
+              <a:rPr lang="en-US" sz="1200" dirty="0" smtClean="0"/>
+              <a:t>Maxent Projection ASCII files</a:t>
+            </a:r>
+            <a:endParaRPr lang="en-US" sz="1200" dirty="0"/>
+          </a:p>
+        </p:txBody>
+      </p:sp>
+      <p:sp>
+        <p:nvSpPr>
+          <p:cNvPr id="45" name="Oval 44"/>
+          <p:cNvSpPr/>
+          <p:nvPr/>
+        </p:nvSpPr>
+        <p:spPr>
+          <a:xfrm>
+            <a:off x="3865900" y="3597030"/>
+            <a:ext cx="1158406" cy="648031"/>
+          </a:xfrm>
+          <a:prstGeom prst="ellipse">
+            <a:avLst/>
+          </a:prstGeom>
+        </p:spPr>
+        <p:style>
+          <a:lnRef idx="2">
+            <a:schemeClr val="accent4">
+              <a:shade val="50000"/>
+            </a:schemeClr>
+          </a:lnRef>
+          <a:fillRef idx="1">
+            <a:schemeClr val="accent4"/>
+          </a:fillRef>
+          <a:effectRef idx="0">
+            <a:schemeClr val="accent4"/>
+          </a:effectRef>
+          <a:fontRef idx="minor">
+            <a:schemeClr val="lt1"/>
+          </a:fontRef>
+        </p:style>
+        <p:txBody>
+          <a:bodyPr rtlCol="0" anchor="ctr"/>
+          <a:lstStyle/>
+          <a:p>
+            <a:pPr algn="ctr"/>
+            <a:r>
+              <a:rPr lang="en-US" sz="1200" dirty="0" smtClean="0">
+                <a:solidFill>
+                  <a:schemeClr val="tx1"/>
+                </a:solidFill>
+              </a:rPr>
+              <a:t>CSV to Maxent ASCII</a:t>
+            </a:r>
+            <a:endParaRPr lang="en-US" sz="1200" dirty="0">
+              <a:solidFill>
+                <a:schemeClr val="tx1"/>
+              </a:solidFill>
+            </a:endParaRPr>
+          </a:p>
+        </p:txBody>
+      </p:sp>
+      <p:cxnSp>
+        <p:nvCxnSpPr>
+          <p:cNvPr id="37" name="Straight Arrow Connector 36"/>
+          <p:cNvCxnSpPr>
+            <a:stCxn id="6" idx="1"/>
+            <a:endCxn id="45" idx="0"/>
+          </p:cNvCxnSpPr>
+          <p:nvPr/>
+        </p:nvCxnSpPr>
+        <p:spPr>
+          <a:xfrm>
+            <a:off x="4445103" y="3263514"/>
+            <a:ext cx="0" cy="333516"/>
+          </a:xfrm>
+          <a:prstGeom prst="straightConnector1">
+            <a:avLst/>
+          </a:prstGeom>
+          <a:ln>
+            <a:tailEnd type="triangle"/>
+          </a:ln>
+        </p:spPr>
+        <p:style>
+          <a:lnRef idx="1">
+            <a:schemeClr val="accent1"/>
+          </a:lnRef>
+          <a:fillRef idx="0">
+            <a:schemeClr val="accent1"/>
+          </a:fillRef>
+          <a:effectRef idx="0">
+            <a:schemeClr val="accent1"/>
+          </a:effectRef>
+          <a:fontRef idx="minor">
+            <a:schemeClr val="tx1"/>
+          </a:fontRef>
+        </p:style>
+      </p:cxnSp>
+      <p:cxnSp>
+        <p:nvCxnSpPr>
+          <p:cNvPr id="40" name="Straight Arrow Connector 39"/>
+          <p:cNvCxnSpPr>
+            <a:stCxn id="45" idx="4"/>
+            <a:endCxn id="44" idx="3"/>
+          </p:cNvCxnSpPr>
+          <p:nvPr/>
+        </p:nvCxnSpPr>
+        <p:spPr>
+          <a:xfrm>
+            <a:off x="4445103" y="4245061"/>
+            <a:ext cx="0" cy="256708"/>
+          </a:xfrm>
+          <a:prstGeom prst="straightConnector1">
+            <a:avLst/>
+          </a:prstGeom>
+          <a:ln>
+            <a:tailEnd type="triangle"/>
+          </a:ln>
+        </p:spPr>
+        <p:style>
+          <a:lnRef idx="1">
+            <a:schemeClr val="accent1"/>
+          </a:lnRef>
+          <a:fillRef idx="0">
+            <a:schemeClr val="accent1"/>
+          </a:fillRef>
+          <a:effectRef idx="0">
+            <a:schemeClr val="accent1"/>
+          </a:effectRef>
+          <a:fontRef idx="minor">
+            <a:schemeClr val="tx1"/>
+          </a:fontRef>
+        </p:style>
+      </p:cxnSp>
+      <p:cxnSp>
+        <p:nvCxnSpPr>
+          <p:cNvPr id="66" name="Elbow Connector 65"/>
+          <p:cNvCxnSpPr>
+            <a:stCxn id="44" idx="1"/>
+            <a:endCxn id="72" idx="6"/>
+          </p:cNvCxnSpPr>
+          <p:nvPr/>
+        </p:nvCxnSpPr>
+        <p:spPr>
+          <a:xfrm rot="5400000">
+            <a:off x="3912586" y="4932829"/>
+            <a:ext cx="309652" cy="755382"/>
+          </a:xfrm>
+          <a:prstGeom prst="bentConnector2">
+            <a:avLst/>
+          </a:prstGeom>
+          <a:ln>
+            <a:tailEnd type="triangle"/>
+          </a:ln>
+        </p:spPr>
+        <p:style>
+          <a:lnRef idx="1">
+            <a:schemeClr val="accent1"/>
+          </a:lnRef>
+          <a:fillRef idx="0">
+            <a:schemeClr val="accent1"/>
+          </a:fillRef>
+          <a:effectRef idx="0">
+            <a:schemeClr val="accent1"/>
+          </a:effectRef>
+          <a:fontRef idx="minor">
+            <a:schemeClr val="tx1"/>
+          </a:fontRef>
+        </p:style>
+      </p:cxnSp>
+      <p:cxnSp>
+        <p:nvCxnSpPr>
+          <p:cNvPr id="68" name="Elbow Connector 67"/>
+          <p:cNvCxnSpPr>
+            <a:stCxn id="77" idx="1"/>
+            <a:endCxn id="72" idx="2"/>
+          </p:cNvCxnSpPr>
+          <p:nvPr/>
+        </p:nvCxnSpPr>
+        <p:spPr>
+          <a:xfrm rot="16200000" flipH="1">
+            <a:off x="1993675" y="4927706"/>
+            <a:ext cx="309652" cy="765627"/>
+          </a:xfrm>
+          <a:prstGeom prst="bentConnector2">
+            <a:avLst/>
+          </a:prstGeom>
+          <a:ln>
+            <a:tailEnd type="triangle"/>
+          </a:ln>
+        </p:spPr>
+        <p:style>
+          <a:lnRef idx="1">
+            <a:schemeClr val="accent1"/>
+          </a:lnRef>
+          <a:fillRef idx="0">
+            <a:schemeClr val="accent1"/>
+          </a:fillRef>
+          <a:effectRef idx="0">
+            <a:schemeClr val="accent1"/>
+          </a:effectRef>
+          <a:fontRef idx="minor">
+            <a:schemeClr val="tx1"/>
+          </a:fontRef>
+        </p:style>
+      </p:cxnSp>
+      <p:sp>
+        <p:nvSpPr>
+          <p:cNvPr id="85" name="Round Same Side Corner Rectangle 84"/>
+          <p:cNvSpPr/>
+          <p:nvPr/>
+        </p:nvSpPr>
+        <p:spPr>
+          <a:xfrm>
+            <a:off x="1258490" y="6005034"/>
+            <a:ext cx="1230502" cy="653925"/>
+          </a:xfrm>
+          <a:prstGeom prst="round2SameRect">
+            <a:avLst/>
+          </a:prstGeom>
+        </p:spPr>
+        <p:style>
+          <a:lnRef idx="2">
+            <a:schemeClr val="accent1">
+              <a:shade val="50000"/>
+            </a:schemeClr>
+          </a:lnRef>
+          <a:fillRef idx="1">
+            <a:schemeClr val="accent1"/>
+          </a:fillRef>
+          <a:effectRef idx="0">
+            <a:schemeClr val="accent1"/>
+          </a:effectRef>
+          <a:fontRef idx="minor">
+            <a:schemeClr val="lt1"/>
+          </a:fontRef>
+        </p:style>
+        <p:txBody>
+          <a:bodyPr rtlCol="0" anchor="ctr"/>
+          <a:lstStyle/>
+          <a:p>
+            <a:pPr algn="ctr"/>
+            <a:r>
+              <a:rPr lang="en-US" sz="1200" b="1" dirty="0" smtClean="0">
+                <a:solidFill>
+                  <a:schemeClr val="tx1"/>
+                </a:solidFill>
+              </a:rPr>
+              <a:t>Current Conditions</a:t>
+            </a:r>
+            <a:endParaRPr lang="en-US" sz="1200" b="1" dirty="0">
+              <a:solidFill>
+                <a:schemeClr val="tx1"/>
+              </a:solidFill>
+            </a:endParaRPr>
+          </a:p>
+        </p:txBody>
+      </p:sp>
+      <p:sp>
+        <p:nvSpPr>
+          <p:cNvPr id="86" name="Round Same Side Corner Rectangle 85"/>
+          <p:cNvSpPr/>
+          <p:nvPr/>
+        </p:nvSpPr>
+        <p:spPr>
+          <a:xfrm>
+            <a:off x="3829852" y="6005035"/>
+            <a:ext cx="1230502" cy="653925"/>
+          </a:xfrm>
+          <a:prstGeom prst="round2SameRect">
+            <a:avLst/>
+          </a:prstGeom>
+        </p:spPr>
+        <p:style>
+          <a:lnRef idx="2">
+            <a:schemeClr val="accent1">
+              <a:shade val="50000"/>
+            </a:schemeClr>
+          </a:lnRef>
+          <a:fillRef idx="1">
+            <a:schemeClr val="accent1"/>
+          </a:fillRef>
+          <a:effectRef idx="0">
+            <a:schemeClr val="accent1"/>
+          </a:effectRef>
+          <a:fontRef idx="minor">
+            <a:schemeClr val="lt1"/>
+          </a:fontRef>
+        </p:style>
+        <p:txBody>
+          <a:bodyPr rtlCol="0" anchor="ctr"/>
+          <a:lstStyle/>
+          <a:p>
+            <a:pPr algn="ctr"/>
+            <a:r>
+              <a:rPr lang="en-US" sz="1200" b="1" dirty="0" smtClean="0">
+                <a:solidFill>
+                  <a:schemeClr val="tx1"/>
+                </a:solidFill>
+              </a:rPr>
+              <a:t>Scenario Conditions</a:t>
+            </a:r>
+            <a:endParaRPr lang="en-US" sz="1200" b="1" dirty="0">
+              <a:solidFill>
+                <a:schemeClr val="tx1"/>
+              </a:solidFill>
+            </a:endParaRPr>
+          </a:p>
+        </p:txBody>
+      </p:sp>
+      <p:cxnSp>
+        <p:nvCxnSpPr>
+          <p:cNvPr id="83" name="Straight Arrow Connector 82"/>
+          <p:cNvCxnSpPr>
+            <a:stCxn id="72" idx="4"/>
+            <a:endCxn id="85" idx="0"/>
+          </p:cNvCxnSpPr>
+          <p:nvPr/>
+        </p:nvCxnSpPr>
+        <p:spPr>
+          <a:xfrm flipH="1">
+            <a:off x="2488992" y="5789361"/>
+            <a:ext cx="621526" cy="542636"/>
+          </a:xfrm>
+          <a:prstGeom prst="straightConnector1">
+            <a:avLst/>
+          </a:prstGeom>
+          <a:ln>
+            <a:tailEnd type="triangle"/>
+          </a:ln>
+        </p:spPr>
+        <p:style>
+          <a:lnRef idx="1">
+            <a:schemeClr val="accent1"/>
+          </a:lnRef>
+          <a:fillRef idx="0">
+            <a:schemeClr val="accent1"/>
+          </a:fillRef>
+          <a:effectRef idx="0">
+            <a:schemeClr val="accent1"/>
+          </a:effectRef>
+          <a:fontRef idx="minor">
+            <a:schemeClr val="tx1"/>
+          </a:fontRef>
+        </p:style>
+      </p:cxnSp>
+      <p:cxnSp>
+        <p:nvCxnSpPr>
+          <p:cNvPr id="88" name="Straight Arrow Connector 87"/>
+          <p:cNvCxnSpPr>
+            <a:stCxn id="72" idx="4"/>
+            <a:endCxn id="86" idx="2"/>
+          </p:cNvCxnSpPr>
+          <p:nvPr/>
+        </p:nvCxnSpPr>
+        <p:spPr>
+          <a:xfrm>
+            <a:off x="3110518" y="5789361"/>
+            <a:ext cx="719334" cy="542637"/>
+          </a:xfrm>
+          <a:prstGeom prst="straightConnector1">
+            <a:avLst/>
+          </a:prstGeom>
+          <a:ln>
+            <a:tailEnd type="triangle"/>
+          </a:ln>
+        </p:spPr>
+        <p:style>
+          <a:lnRef idx="1">
+            <a:schemeClr val="accent1"/>
+          </a:lnRef>
+          <a:fillRef idx="0">
+            <a:schemeClr val="accent1"/>
+          </a:fillRef>
+          <a:effectRef idx="0">
+            <a:schemeClr val="accent1"/>
+          </a:effectRef>
+          <a:fontRef idx="minor">
+            <a:schemeClr val="tx1"/>
+          </a:fontRef>
+        </p:style>
+      </p:cxnSp>
+      <p:sp>
+        <p:nvSpPr>
+          <p:cNvPr id="94" name="TextBox 93"/>
+          <p:cNvSpPr txBox="1"/>
+          <p:nvPr/>
+        </p:nvSpPr>
+        <p:spPr>
+          <a:xfrm>
+            <a:off x="614782" y="2583186"/>
+            <a:ext cx="210790" cy="307777"/>
+          </a:xfrm>
+          <a:prstGeom prst="rect">
+            <a:avLst/>
+          </a:prstGeom>
+          <a:solidFill>
+            <a:schemeClr val="bg1">
+              <a:lumMod val="95000"/>
+            </a:schemeClr>
+          </a:solidFill>
+          <a:ln>
+            <a:noFill/>
+          </a:ln>
+          <a:effectLst>
+            <a:outerShdw blurRad="50800" dist="38100" dir="2700000" algn="tl" rotWithShape="0">
+              <a:prstClr val="black">
+                <a:alpha val="40000"/>
+              </a:prstClr>
+            </a:outerShdw>
+          </a:effectLst>
+        </p:spPr>
+        <p:style>
+          <a:lnRef idx="2">
+            <a:schemeClr val="accent1"/>
+          </a:lnRef>
+          <a:fillRef idx="1">
+            <a:schemeClr val="lt1"/>
+          </a:fillRef>
+          <a:effectRef idx="0">
+            <a:schemeClr val="accent1"/>
+          </a:effectRef>
+          <a:fontRef idx="minor">
+            <a:schemeClr val="dk1"/>
+          </a:fontRef>
+        </p:style>
+        <p:txBody>
+          <a:bodyPr wrap="square" rtlCol="0">
+            <a:spAutoFit/>
+          </a:bodyPr>
+          <a:lstStyle/>
+          <a:p>
+            <a:pPr algn="ctr"/>
+            <a:r>
+              <a:rPr lang="en-US" sz="1400" i="1" dirty="0" smtClean="0">
+                <a:solidFill>
+                  <a:srgbClr val="FF0000"/>
+                </a:solidFill>
+              </a:rPr>
+              <a:t>1</a:t>
+            </a:r>
+            <a:endParaRPr lang="en-US" sz="1400" i="1" dirty="0">
+              <a:solidFill>
+                <a:srgbClr val="FF0000"/>
+              </a:solidFill>
+            </a:endParaRPr>
+          </a:p>
+        </p:txBody>
+      </p:sp>
+      <p:sp>
+        <p:nvSpPr>
+          <p:cNvPr id="95" name="TextBox 94"/>
+          <p:cNvSpPr txBox="1"/>
+          <p:nvPr/>
+        </p:nvSpPr>
+        <p:spPr>
+          <a:xfrm>
+            <a:off x="5046284" y="3624548"/>
+            <a:ext cx="210790" cy="307777"/>
+          </a:xfrm>
+          <a:prstGeom prst="rect">
+            <a:avLst/>
+          </a:prstGeom>
+          <a:solidFill>
+            <a:schemeClr val="bg1">
+              <a:lumMod val="95000"/>
+            </a:schemeClr>
+          </a:solidFill>
+          <a:ln>
+            <a:noFill/>
+          </a:ln>
+          <a:effectLst>
+            <a:outerShdw blurRad="50800" dist="38100" dir="2700000" algn="tl" rotWithShape="0">
+              <a:prstClr val="black">
+                <a:alpha val="40000"/>
+              </a:prstClr>
+            </a:outerShdw>
+          </a:effectLst>
+        </p:spPr>
+        <p:style>
+          <a:lnRef idx="2">
+            <a:schemeClr val="accent1"/>
+          </a:lnRef>
+          <a:fillRef idx="1">
+            <a:schemeClr val="lt1"/>
+          </a:fillRef>
+          <a:effectRef idx="0">
+            <a:schemeClr val="accent1"/>
+          </a:effectRef>
+          <a:fontRef idx="minor">
+            <a:schemeClr val="dk1"/>
+          </a:fontRef>
+        </p:style>
+        <p:txBody>
+          <a:bodyPr wrap="square" rtlCol="0">
+            <a:spAutoFit/>
+          </a:bodyPr>
+          <a:lstStyle/>
+          <a:p>
+            <a:pPr algn="ctr"/>
+            <a:r>
+              <a:rPr lang="en-US" sz="1400" i="1" dirty="0" smtClean="0">
+                <a:solidFill>
+                  <a:srgbClr val="FF0000"/>
+                </a:solidFill>
+              </a:rPr>
+              <a:t>3</a:t>
+            </a:r>
+            <a:endParaRPr lang="en-US" sz="1400" i="1" dirty="0">
+              <a:solidFill>
+                <a:srgbClr val="FF0000"/>
+              </a:solidFill>
+            </a:endParaRPr>
+          </a:p>
+        </p:txBody>
+      </p:sp>
+      <p:sp>
+        <p:nvSpPr>
+          <p:cNvPr id="96" name="TextBox 95"/>
+          <p:cNvSpPr txBox="1"/>
+          <p:nvPr/>
+        </p:nvSpPr>
+        <p:spPr>
+          <a:xfrm flipH="1">
+            <a:off x="5644576" y="428816"/>
+            <a:ext cx="258308" cy="307777"/>
+          </a:xfrm>
+          <a:prstGeom prst="rect">
+            <a:avLst/>
+          </a:prstGeom>
+          <a:solidFill>
+            <a:schemeClr val="bg1">
+              <a:lumMod val="95000"/>
+            </a:schemeClr>
+          </a:solidFill>
+          <a:ln>
+            <a:noFill/>
+          </a:ln>
+          <a:effectLst>
+            <a:outerShdw blurRad="50800" dist="38100" dir="2700000" algn="tl" rotWithShape="0">
+              <a:prstClr val="black">
+                <a:alpha val="40000"/>
+              </a:prstClr>
+            </a:outerShdw>
+          </a:effectLst>
+        </p:spPr>
+        <p:style>
+          <a:lnRef idx="2">
+            <a:schemeClr val="accent1"/>
+          </a:lnRef>
+          <a:fillRef idx="1">
+            <a:schemeClr val="lt1"/>
+          </a:fillRef>
+          <a:effectRef idx="0">
+            <a:schemeClr val="accent1"/>
+          </a:effectRef>
+          <a:fontRef idx="minor">
+            <a:schemeClr val="dk1"/>
+          </a:fontRef>
+        </p:style>
+        <p:txBody>
+          <a:bodyPr wrap="square" rtlCol="0">
+            <a:spAutoFit/>
+          </a:bodyPr>
+          <a:lstStyle/>
+          <a:p>
+            <a:pPr algn="ctr"/>
+            <a:r>
+              <a:rPr lang="en-US" sz="1400" i="1" dirty="0" smtClean="0">
+                <a:solidFill>
+                  <a:srgbClr val="FF0000"/>
+                </a:solidFill>
+              </a:rPr>
+              <a:t>1</a:t>
+            </a:r>
+            <a:endParaRPr lang="en-US" sz="1400" i="1" dirty="0">
+              <a:solidFill>
+                <a:srgbClr val="FF0000"/>
+              </a:solidFill>
+            </a:endParaRPr>
+          </a:p>
+        </p:txBody>
+      </p:sp>
+      <p:sp>
+        <p:nvSpPr>
+          <p:cNvPr id="97" name="TextBox 96"/>
+          <p:cNvSpPr txBox="1"/>
+          <p:nvPr/>
+        </p:nvSpPr>
+        <p:spPr>
+          <a:xfrm>
+            <a:off x="6072216" y="428816"/>
+            <a:ext cx="6008622" cy="2246769"/>
+          </a:xfrm>
+          <a:prstGeom prst="rect">
+            <a:avLst/>
+          </a:prstGeom>
+          <a:solidFill>
+            <a:schemeClr val="bg1">
+              <a:lumMod val="95000"/>
+            </a:schemeClr>
+          </a:solidFill>
+          <a:effectLst>
+            <a:outerShdw blurRad="50800" dist="38100" dir="2700000" algn="tl" rotWithShape="0">
+              <a:prstClr val="black">
+                <a:alpha val="40000"/>
+              </a:prstClr>
+            </a:outerShdw>
+          </a:effectLst>
+        </p:spPr>
+        <p:txBody>
+          <a:bodyPr wrap="square" rtlCol="0">
+            <a:spAutoFit/>
+          </a:bodyPr>
+          <a:lstStyle/>
+          <a:p>
+            <a:pPr marL="285750" indent="-285750">
+              <a:buFont typeface="Arial" panose="020B0604020202020204" pitchFamily="34" charset="0"/>
+              <a:buChar char="•"/>
+            </a:pPr>
+            <a:r>
+              <a:rPr lang="en-US" sz="1400" dirty="0" smtClean="0"/>
+              <a:t>Identifies the HUC8s in which the species was found and extracts all StreamCat catchment records within them. </a:t>
+            </a:r>
+          </a:p>
+          <a:p>
+            <a:pPr marL="285750" indent="-285750">
+              <a:buFont typeface="Arial" panose="020B0604020202020204" pitchFamily="34" charset="0"/>
+              <a:buChar char="•"/>
+            </a:pPr>
+            <a:r>
+              <a:rPr lang="en-US" sz="1400" dirty="0" smtClean="0"/>
+              <a:t>Removes any </a:t>
+            </a:r>
+            <a:r>
+              <a:rPr lang="en-US" sz="1400" u="sng" dirty="0" smtClean="0"/>
+              <a:t>records</a:t>
+            </a:r>
+            <a:r>
+              <a:rPr lang="en-US" sz="1400" dirty="0" smtClean="0"/>
+              <a:t> with missing data where the species was not found and then any </a:t>
+            </a:r>
+            <a:r>
+              <a:rPr lang="en-US" sz="1400" u="sng" dirty="0" smtClean="0"/>
+              <a:t>attributes</a:t>
+            </a:r>
+            <a:r>
+              <a:rPr lang="en-US" sz="1400" dirty="0" smtClean="0"/>
+              <a:t> with no data where the species was found. </a:t>
+            </a:r>
+          </a:p>
+          <a:p>
+            <a:pPr marL="285750" indent="-285750">
+              <a:buFont typeface="Arial" panose="020B0604020202020204" pitchFamily="34" charset="0"/>
+              <a:buChar char="•"/>
+            </a:pPr>
+            <a:r>
+              <a:rPr lang="en-US" sz="1400" dirty="0" smtClean="0"/>
+              <a:t>Removes any </a:t>
+            </a:r>
+            <a:r>
+              <a:rPr lang="en-US" sz="1400" u="sng" dirty="0" smtClean="0"/>
+              <a:t>attributes</a:t>
+            </a:r>
+            <a:r>
+              <a:rPr lang="en-US" sz="1400" dirty="0" smtClean="0"/>
+              <a:t> with no significant correlation with presence/absence </a:t>
+            </a:r>
+            <a:r>
+              <a:rPr lang="en-US" sz="1100" dirty="0" smtClean="0"/>
+              <a:t>(p &gt; 0.05)</a:t>
+            </a:r>
+            <a:r>
+              <a:rPr lang="en-US" sz="1400" dirty="0" smtClean="0"/>
+              <a:t>. Then identifies cross-correlated attributes pairs</a:t>
+            </a:r>
+            <a:r>
+              <a:rPr lang="en-US" sz="1100" dirty="0" smtClean="0"/>
+              <a:t> (r &gt; 0.75) </a:t>
+            </a:r>
+            <a:r>
+              <a:rPr lang="en-US" sz="1400" dirty="0" smtClean="0"/>
+              <a:t>and removes the one with the least correlation with presence/absence. </a:t>
+            </a:r>
+          </a:p>
+          <a:p>
+            <a:pPr marL="285750" indent="-285750">
+              <a:buFont typeface="Arial" panose="020B0604020202020204" pitchFamily="34" charset="0"/>
+              <a:buChar char="•"/>
+            </a:pPr>
+            <a:r>
+              <a:rPr lang="en-US" sz="1400" dirty="0" smtClean="0"/>
+              <a:t>Formats columns and column names to suit the MaxEnt species with data (SWD) format. </a:t>
+            </a:r>
+            <a:endParaRPr lang="en-US" sz="1400" dirty="0"/>
+          </a:p>
+        </p:txBody>
+      </p:sp>
+      <p:sp>
+        <p:nvSpPr>
+          <p:cNvPr id="98" name="TextBox 97"/>
+          <p:cNvSpPr txBox="1"/>
+          <p:nvPr/>
+        </p:nvSpPr>
+        <p:spPr>
+          <a:xfrm flipH="1">
+            <a:off x="5644576" y="2826315"/>
+            <a:ext cx="258308" cy="307777"/>
+          </a:xfrm>
+          <a:prstGeom prst="rect">
+            <a:avLst/>
+          </a:prstGeom>
+          <a:solidFill>
+            <a:schemeClr val="bg1">
+              <a:lumMod val="95000"/>
+            </a:schemeClr>
+          </a:solidFill>
+          <a:ln>
+            <a:noFill/>
+          </a:ln>
+          <a:effectLst>
+            <a:outerShdw blurRad="50800" dist="38100" dir="2700000" algn="tl" rotWithShape="0">
+              <a:prstClr val="black">
+                <a:alpha val="40000"/>
+              </a:prstClr>
+            </a:outerShdw>
+          </a:effectLst>
+        </p:spPr>
+        <p:style>
+          <a:lnRef idx="2">
+            <a:schemeClr val="accent1"/>
+          </a:lnRef>
+          <a:fillRef idx="1">
+            <a:schemeClr val="lt1"/>
+          </a:fillRef>
+          <a:effectRef idx="0">
+            <a:schemeClr val="accent1"/>
+          </a:effectRef>
+          <a:fontRef idx="minor">
+            <a:schemeClr val="dk1"/>
+          </a:fontRef>
+        </p:style>
+        <p:txBody>
+          <a:bodyPr wrap="square" rtlCol="0">
+            <a:spAutoFit/>
+          </a:bodyPr>
+          <a:lstStyle/>
+          <a:p>
+            <a:pPr algn="ctr"/>
+            <a:r>
+              <a:rPr lang="en-US" sz="1400" i="1" dirty="0" smtClean="0">
+                <a:solidFill>
+                  <a:srgbClr val="FF0000"/>
+                </a:solidFill>
+              </a:rPr>
+              <a:t>2</a:t>
+            </a:r>
+            <a:endParaRPr lang="en-US" sz="1400" i="1" dirty="0">
+              <a:solidFill>
+                <a:srgbClr val="FF0000"/>
+              </a:solidFill>
+            </a:endParaRPr>
+          </a:p>
+        </p:txBody>
+      </p:sp>
+      <p:sp>
+        <p:nvSpPr>
+          <p:cNvPr id="99" name="TextBox 98"/>
+          <p:cNvSpPr txBox="1"/>
+          <p:nvPr/>
+        </p:nvSpPr>
+        <p:spPr>
+          <a:xfrm>
+            <a:off x="6072216" y="2826315"/>
+            <a:ext cx="6008622" cy="1169551"/>
+          </a:xfrm>
+          <a:prstGeom prst="rect">
+            <a:avLst/>
+          </a:prstGeom>
+          <a:solidFill>
+            <a:schemeClr val="bg1">
+              <a:lumMod val="95000"/>
+            </a:schemeClr>
+          </a:solidFill>
+          <a:effectLst>
+            <a:outerShdw blurRad="50800" dist="38100" dir="2700000" algn="tl" rotWithShape="0">
+              <a:prstClr val="black">
+                <a:alpha val="40000"/>
+              </a:prstClr>
+            </a:outerShdw>
+          </a:effectLst>
+        </p:spPr>
+        <p:txBody>
+          <a:bodyPr wrap="square" rtlCol="0">
+            <a:spAutoFit/>
+          </a:bodyPr>
+          <a:lstStyle/>
+          <a:p>
+            <a:pPr marL="285750" indent="-285750">
+              <a:buFont typeface="Arial" panose="020B0604020202020204" pitchFamily="34" charset="0"/>
+              <a:buChar char="•"/>
+            </a:pPr>
+            <a:r>
+              <a:rPr lang="en-US" sz="1400" dirty="0" smtClean="0"/>
+              <a:t>Allows user to draw a shape on a map reflecting a change in land cover type. </a:t>
+            </a:r>
+          </a:p>
+          <a:p>
+            <a:pPr marL="285750" indent="-285750">
+              <a:buFont typeface="Arial" panose="020B0604020202020204" pitchFamily="34" charset="0"/>
+              <a:buChar char="•"/>
+            </a:pPr>
+            <a:r>
+              <a:rPr lang="en-US" sz="1400" dirty="0" smtClean="0"/>
+              <a:t>The user also designates the analysis extent for projecting uplift. This is usually the HUC 6 in which the modification occurs.</a:t>
+            </a:r>
+          </a:p>
+          <a:p>
+            <a:pPr marL="285750" indent="-285750">
+              <a:buFont typeface="Arial" panose="020B0604020202020204" pitchFamily="34" charset="0"/>
+              <a:buChar char="•"/>
+            </a:pPr>
+            <a:r>
+              <a:rPr lang="en-US" sz="1400" dirty="0" smtClean="0"/>
+              <a:t>Based on this change, adjusts values in appropriate StreamCat attribute values for affected records. </a:t>
+            </a:r>
+            <a:endParaRPr lang="en-US" sz="1400" dirty="0"/>
+          </a:p>
+        </p:txBody>
+      </p:sp>
+      <p:sp>
+        <p:nvSpPr>
+          <p:cNvPr id="100" name="TextBox 99"/>
+          <p:cNvSpPr txBox="1"/>
+          <p:nvPr/>
+        </p:nvSpPr>
+        <p:spPr>
+          <a:xfrm flipH="1">
+            <a:off x="5644576" y="4125672"/>
+            <a:ext cx="258308" cy="307777"/>
+          </a:xfrm>
+          <a:prstGeom prst="rect">
+            <a:avLst/>
+          </a:prstGeom>
+          <a:solidFill>
+            <a:schemeClr val="bg1">
+              <a:lumMod val="95000"/>
+            </a:schemeClr>
+          </a:solidFill>
+          <a:ln>
+            <a:noFill/>
+          </a:ln>
+          <a:effectLst>
+            <a:outerShdw blurRad="50800" dist="38100" dir="2700000" algn="tl" rotWithShape="0">
+              <a:prstClr val="black">
+                <a:alpha val="40000"/>
+              </a:prstClr>
+            </a:outerShdw>
+          </a:effectLst>
+        </p:spPr>
+        <p:style>
+          <a:lnRef idx="2">
+            <a:schemeClr val="accent1"/>
+          </a:lnRef>
+          <a:fillRef idx="1">
+            <a:schemeClr val="lt1"/>
+          </a:fillRef>
+          <a:effectRef idx="0">
+            <a:schemeClr val="accent1"/>
+          </a:effectRef>
+          <a:fontRef idx="minor">
+            <a:schemeClr val="dk1"/>
+          </a:fontRef>
+        </p:style>
+        <p:txBody>
+          <a:bodyPr wrap="square" rtlCol="0">
+            <a:spAutoFit/>
+          </a:bodyPr>
+          <a:lstStyle/>
+          <a:p>
+            <a:pPr algn="ctr"/>
+            <a:r>
+              <a:rPr lang="en-US" sz="1400" i="1" dirty="0" smtClean="0">
+                <a:solidFill>
+                  <a:srgbClr val="FF0000"/>
+                </a:solidFill>
+              </a:rPr>
+              <a:t>3</a:t>
+            </a:r>
+            <a:endParaRPr lang="en-US" sz="1400" i="1" dirty="0">
+              <a:solidFill>
+                <a:srgbClr val="FF0000"/>
+              </a:solidFill>
+            </a:endParaRPr>
+          </a:p>
+        </p:txBody>
+      </p:sp>
+      <p:sp>
+        <p:nvSpPr>
+          <p:cNvPr id="101" name="TextBox 100"/>
+          <p:cNvSpPr txBox="1"/>
+          <p:nvPr/>
+        </p:nvSpPr>
+        <p:spPr>
+          <a:xfrm>
+            <a:off x="6072216" y="4125672"/>
+            <a:ext cx="6008622" cy="738664"/>
+          </a:xfrm>
+          <a:prstGeom prst="rect">
+            <a:avLst/>
+          </a:prstGeom>
+          <a:solidFill>
+            <a:schemeClr val="bg1">
+              <a:lumMod val="95000"/>
+            </a:schemeClr>
+          </a:solidFill>
+          <a:effectLst>
+            <a:outerShdw blurRad="50800" dist="38100" dir="2700000" algn="tl" rotWithShape="0">
+              <a:prstClr val="black">
+                <a:alpha val="40000"/>
+              </a:prstClr>
+            </a:outerShdw>
+          </a:effectLst>
+        </p:spPr>
+        <p:txBody>
+          <a:bodyPr wrap="square" rtlCol="0">
+            <a:spAutoFit/>
+          </a:bodyPr>
+          <a:lstStyle/>
+          <a:p>
+            <a:pPr marL="285750" indent="-285750">
+              <a:buFont typeface="Arial" panose="020B0604020202020204" pitchFamily="34" charset="0"/>
+              <a:buChar char="•"/>
+            </a:pPr>
+            <a:r>
+              <a:rPr lang="en-US" sz="1400" dirty="0" smtClean="0"/>
+              <a:t>Converts each set of StreamCat within the analysis extent (e.g. HUC 6) into its own pseudo-ASCII raster so that it can be used as a MaxEnt projection scenario.   </a:t>
+            </a:r>
+            <a:endParaRPr lang="en-US" sz="1400" dirty="0"/>
+          </a:p>
+        </p:txBody>
+      </p:sp>
+      <p:sp>
+        <p:nvSpPr>
+          <p:cNvPr id="121" name="Rounded Rectangle 120"/>
+          <p:cNvSpPr/>
+          <p:nvPr/>
+        </p:nvSpPr>
+        <p:spPr>
+          <a:xfrm>
+            <a:off x="3139218" y="1170604"/>
+            <a:ext cx="2253018" cy="5591440"/>
+          </a:xfrm>
+          <a:prstGeom prst="roundRect">
+            <a:avLst/>
+          </a:prstGeom>
+          <a:noFill/>
+          <a:ln>
+            <a:prstDash val="dash"/>
+          </a:ln>
+        </p:spPr>
+        <p:style>
+          <a:lnRef idx="2">
+            <a:schemeClr val="accent1">
+              <a:shade val="50000"/>
+            </a:schemeClr>
+          </a:lnRef>
+          <a:fillRef idx="1">
+            <a:schemeClr val="accent1"/>
+          </a:fillRef>
+          <a:effectRef idx="0">
+            <a:schemeClr val="accent1"/>
+          </a:effectRef>
+          <a:fontRef idx="minor">
+            <a:schemeClr val="lt1"/>
+          </a:fontRef>
+        </p:style>
+        <p:txBody>
+          <a:bodyPr rtlCol="0" anchor="ctr"/>
+          <a:lstStyle/>
+          <a:p>
+            <a:pPr algn="ctr"/>
+            <a:endParaRPr lang="en-US"/>
+          </a:p>
+        </p:txBody>
+      </p:sp>
+      <p:sp>
+        <p:nvSpPr>
+          <p:cNvPr id="72" name="Oval 71"/>
+          <p:cNvSpPr/>
+          <p:nvPr/>
+        </p:nvSpPr>
+        <p:spPr>
+          <a:xfrm>
+            <a:off x="2531315" y="5141330"/>
+            <a:ext cx="1158406" cy="648031"/>
+          </a:xfrm>
+          <a:prstGeom prst="ellipse">
+            <a:avLst/>
+          </a:prstGeom>
+          <a:solidFill>
+            <a:schemeClr val="accent6">
+              <a:lumMod val="50000"/>
+            </a:schemeClr>
+          </a:solidFill>
+          <a:ln>
+            <a:solidFill>
+              <a:schemeClr val="accent6">
+                <a:lumMod val="50000"/>
+              </a:schemeClr>
+            </a:solidFill>
+          </a:ln>
+          <a:effectLst>
+            <a:outerShdw blurRad="50800" dist="38100" dir="2700000" algn="tl" rotWithShape="0">
+              <a:prstClr val="black">
+                <a:alpha val="40000"/>
+              </a:prstClr>
+            </a:outerShdw>
+          </a:effectLst>
+        </p:spPr>
+        <p:style>
+          <a:lnRef idx="2">
+            <a:schemeClr val="accent4">
+              <a:shade val="50000"/>
+            </a:schemeClr>
+          </a:lnRef>
+          <a:fillRef idx="1">
+            <a:schemeClr val="accent4"/>
+          </a:fillRef>
+          <a:effectRef idx="0">
+            <a:schemeClr val="accent4"/>
+          </a:effectRef>
+          <a:fontRef idx="minor">
+            <a:schemeClr val="lt1"/>
+          </a:fontRef>
+        </p:style>
+        <p:txBody>
+          <a:bodyPr rtlCol="0" anchor="ctr"/>
+          <a:lstStyle/>
+          <a:p>
+            <a:pPr algn="ctr"/>
+            <a:r>
+              <a:rPr lang="en-US" sz="1400" dirty="0" smtClean="0"/>
+              <a:t>MaxEnt</a:t>
+            </a:r>
+            <a:endParaRPr lang="en-US" sz="1400" dirty="0"/>
+          </a:p>
+        </p:txBody>
+      </p:sp>
+      <p:sp>
+        <p:nvSpPr>
+          <p:cNvPr id="93" name="TextBox 92"/>
+          <p:cNvSpPr txBox="1"/>
+          <p:nvPr/>
+        </p:nvSpPr>
+        <p:spPr>
+          <a:xfrm>
+            <a:off x="4386538" y="1834988"/>
+            <a:ext cx="210790" cy="307777"/>
+          </a:xfrm>
+          <a:prstGeom prst="rect">
+            <a:avLst/>
+          </a:prstGeom>
+          <a:solidFill>
+            <a:schemeClr val="bg1">
+              <a:lumMod val="95000"/>
+            </a:schemeClr>
+          </a:solidFill>
+          <a:ln>
+            <a:noFill/>
+          </a:ln>
+          <a:effectLst>
+            <a:outerShdw blurRad="50800" dist="38100" dir="2700000" algn="tl" rotWithShape="0">
+              <a:prstClr val="black">
+                <a:alpha val="40000"/>
+              </a:prstClr>
+            </a:outerShdw>
+          </a:effectLst>
+        </p:spPr>
+        <p:style>
+          <a:lnRef idx="2">
+            <a:schemeClr val="accent1"/>
+          </a:lnRef>
+          <a:fillRef idx="1">
+            <a:schemeClr val="lt1"/>
+          </a:fillRef>
+          <a:effectRef idx="0">
+            <a:schemeClr val="accent1"/>
+          </a:effectRef>
+          <a:fontRef idx="minor">
+            <a:schemeClr val="dk1"/>
+          </a:fontRef>
+        </p:style>
+        <p:txBody>
+          <a:bodyPr wrap="square" rtlCol="0">
+            <a:spAutoFit/>
+          </a:bodyPr>
+          <a:lstStyle/>
+          <a:p>
+            <a:pPr algn="ctr"/>
+            <a:r>
+              <a:rPr lang="en-US" sz="1400" i="1" dirty="0" smtClean="0">
+                <a:solidFill>
+                  <a:srgbClr val="FF0000"/>
+                </a:solidFill>
+              </a:rPr>
+              <a:t>2</a:t>
+            </a:r>
+            <a:endParaRPr lang="en-US" sz="1400" i="1" dirty="0">
+              <a:solidFill>
+                <a:srgbClr val="FF0000"/>
+              </a:solidFill>
+            </a:endParaRPr>
+          </a:p>
+        </p:txBody>
+      </p:sp>
+      <p:sp>
+        <p:nvSpPr>
+          <p:cNvPr id="134" name="TextBox 133"/>
+          <p:cNvSpPr txBox="1"/>
+          <p:nvPr/>
+        </p:nvSpPr>
+        <p:spPr>
+          <a:xfrm rot="16200000">
+            <a:off x="2665838" y="3682660"/>
+            <a:ext cx="1284391" cy="307777"/>
+          </a:xfrm>
+          <a:prstGeom prst="rect">
+            <a:avLst/>
+          </a:prstGeom>
+          <a:noFill/>
+        </p:spPr>
+        <p:txBody>
+          <a:bodyPr wrap="square" rtlCol="0">
+            <a:spAutoFit/>
+          </a:bodyPr>
+          <a:lstStyle/>
+          <a:p>
+            <a:r>
+              <a:rPr lang="en-US" sz="1400" i="1" dirty="0" smtClean="0"/>
+              <a:t>Analysis Extent</a:t>
+            </a:r>
+            <a:endParaRPr lang="en-US" sz="1400" i="1" dirty="0"/>
+          </a:p>
+        </p:txBody>
+      </p:sp>
+      <p:sp>
+        <p:nvSpPr>
+          <p:cNvPr id="136" name="TextBox 135"/>
+          <p:cNvSpPr txBox="1"/>
+          <p:nvPr/>
+        </p:nvSpPr>
+        <p:spPr>
+          <a:xfrm rot="16200000">
+            <a:off x="2374319" y="3691613"/>
+            <a:ext cx="1015086" cy="307777"/>
+          </a:xfrm>
+          <a:prstGeom prst="rect">
+            <a:avLst/>
+          </a:prstGeom>
+          <a:noFill/>
+        </p:spPr>
+        <p:txBody>
+          <a:bodyPr wrap="none" rtlCol="0">
+            <a:spAutoFit/>
+          </a:bodyPr>
+          <a:lstStyle/>
+          <a:p>
+            <a:r>
+              <a:rPr lang="en-US" sz="1400" i="1" dirty="0" smtClean="0"/>
+              <a:t>Entire state</a:t>
+            </a:r>
+            <a:endParaRPr lang="en-US" sz="1400" i="1" dirty="0"/>
+          </a:p>
+        </p:txBody>
+      </p:sp>
+      <p:sp>
+        <p:nvSpPr>
+          <p:cNvPr id="141" name="TextBox 140"/>
+          <p:cNvSpPr txBox="1"/>
+          <p:nvPr/>
+        </p:nvSpPr>
+        <p:spPr>
+          <a:xfrm flipH="1">
+            <a:off x="5089054" y="5851145"/>
+            <a:ext cx="235397" cy="307777"/>
+          </a:xfrm>
+          <a:prstGeom prst="rect">
+            <a:avLst/>
+          </a:prstGeom>
+          <a:solidFill>
+            <a:schemeClr val="accent1">
+              <a:lumMod val="40000"/>
+              <a:lumOff val="60000"/>
+            </a:schemeClr>
+          </a:solidFill>
+          <a:ln>
+            <a:noFill/>
+          </a:ln>
+          <a:effectLst>
+            <a:outerShdw blurRad="50800" dist="38100" dir="2700000" algn="tl" rotWithShape="0">
+              <a:prstClr val="black">
+                <a:alpha val="40000"/>
+              </a:prstClr>
+            </a:outerShdw>
+          </a:effectLst>
+        </p:spPr>
+        <p:style>
+          <a:lnRef idx="2">
+            <a:schemeClr val="accent1"/>
+          </a:lnRef>
+          <a:fillRef idx="1">
+            <a:schemeClr val="lt1"/>
+          </a:fillRef>
+          <a:effectRef idx="0">
+            <a:schemeClr val="accent1"/>
+          </a:effectRef>
+          <a:fontRef idx="minor">
+            <a:schemeClr val="dk1"/>
+          </a:fontRef>
+        </p:style>
+        <p:txBody>
+          <a:bodyPr wrap="square" rtlCol="0">
+            <a:spAutoFit/>
+          </a:bodyPr>
+          <a:lstStyle/>
+          <a:p>
+            <a:pPr algn="ctr"/>
+            <a:r>
+              <a:rPr lang="en-US" sz="1400" i="1" dirty="0" smtClean="0">
+                <a:solidFill>
+                  <a:schemeClr val="tx1"/>
+                </a:solidFill>
+              </a:rPr>
+              <a:t>5</a:t>
+            </a:r>
+            <a:endParaRPr lang="en-US" sz="1400" i="1" dirty="0">
+              <a:solidFill>
+                <a:schemeClr val="tx1"/>
+              </a:solidFill>
+            </a:endParaRPr>
+          </a:p>
+        </p:txBody>
+      </p:sp>
+      <p:sp>
+        <p:nvSpPr>
+          <p:cNvPr id="142" name="TextBox 141"/>
+          <p:cNvSpPr txBox="1"/>
+          <p:nvPr/>
+        </p:nvSpPr>
+        <p:spPr>
+          <a:xfrm flipH="1">
+            <a:off x="941599" y="5851145"/>
+            <a:ext cx="235397" cy="307777"/>
+          </a:xfrm>
+          <a:prstGeom prst="rect">
+            <a:avLst/>
+          </a:prstGeom>
+          <a:solidFill>
+            <a:schemeClr val="accent1">
+              <a:lumMod val="40000"/>
+              <a:lumOff val="60000"/>
+            </a:schemeClr>
+          </a:solidFill>
+          <a:ln>
+            <a:noFill/>
+          </a:ln>
+          <a:effectLst>
+            <a:outerShdw blurRad="50800" dist="38100" dir="2700000" algn="tl" rotWithShape="0">
+              <a:prstClr val="black">
+                <a:alpha val="40000"/>
+              </a:prstClr>
+            </a:outerShdw>
+          </a:effectLst>
+        </p:spPr>
+        <p:style>
+          <a:lnRef idx="2">
+            <a:schemeClr val="accent1"/>
+          </a:lnRef>
+          <a:fillRef idx="1">
+            <a:schemeClr val="lt1"/>
+          </a:fillRef>
+          <a:effectRef idx="0">
+            <a:schemeClr val="accent1"/>
+          </a:effectRef>
+          <a:fontRef idx="minor">
+            <a:schemeClr val="dk1"/>
+          </a:fontRef>
+        </p:style>
+        <p:txBody>
+          <a:bodyPr wrap="square" rtlCol="0">
+            <a:spAutoFit/>
+          </a:bodyPr>
+          <a:lstStyle/>
+          <a:p>
+            <a:pPr algn="ctr"/>
+            <a:r>
+              <a:rPr lang="en-US" sz="1400" i="1" dirty="0" smtClean="0">
+                <a:solidFill>
+                  <a:schemeClr val="tx1"/>
+                </a:solidFill>
+              </a:rPr>
+              <a:t>4</a:t>
+            </a:r>
+            <a:endParaRPr lang="en-US" sz="1400" i="1" dirty="0">
+              <a:solidFill>
+                <a:schemeClr val="tx1"/>
+              </a:solidFill>
+            </a:endParaRPr>
+          </a:p>
+        </p:txBody>
+      </p:sp>
+      <p:sp>
+        <p:nvSpPr>
+          <p:cNvPr id="143" name="TextBox 142"/>
+          <p:cNvSpPr txBox="1"/>
+          <p:nvPr/>
+        </p:nvSpPr>
+        <p:spPr>
+          <a:xfrm flipH="1">
+            <a:off x="5644576" y="5233426"/>
+            <a:ext cx="258308" cy="307777"/>
+          </a:xfrm>
+          <a:prstGeom prst="rect">
+            <a:avLst/>
+          </a:prstGeom>
+          <a:solidFill>
+            <a:schemeClr val="accent1">
+              <a:lumMod val="40000"/>
+              <a:lumOff val="60000"/>
+            </a:schemeClr>
+          </a:solidFill>
+          <a:ln>
+            <a:noFill/>
+          </a:ln>
+          <a:effectLst>
+            <a:outerShdw blurRad="50800" dist="38100" dir="2700000" algn="tl" rotWithShape="0">
+              <a:prstClr val="black">
+                <a:alpha val="40000"/>
+              </a:prstClr>
+            </a:outerShdw>
+          </a:effectLst>
+        </p:spPr>
+        <p:style>
+          <a:lnRef idx="2">
+            <a:schemeClr val="accent1"/>
+          </a:lnRef>
+          <a:fillRef idx="1">
+            <a:schemeClr val="lt1"/>
+          </a:fillRef>
+          <a:effectRef idx="0">
+            <a:schemeClr val="accent1"/>
+          </a:effectRef>
+          <a:fontRef idx="minor">
+            <a:schemeClr val="dk1"/>
+          </a:fontRef>
+        </p:style>
+        <p:txBody>
+          <a:bodyPr wrap="square" rtlCol="0">
+            <a:spAutoFit/>
+          </a:bodyPr>
+          <a:lstStyle/>
+          <a:p>
+            <a:pPr algn="ctr"/>
+            <a:r>
+              <a:rPr lang="en-US" sz="1400" i="1" dirty="0" smtClean="0">
+                <a:solidFill>
+                  <a:schemeClr val="tx1"/>
+                </a:solidFill>
+              </a:rPr>
+              <a:t>4</a:t>
+            </a:r>
+            <a:endParaRPr lang="en-US" sz="1400" i="1" dirty="0">
+              <a:solidFill>
+                <a:schemeClr val="tx1"/>
+              </a:solidFill>
+            </a:endParaRPr>
+          </a:p>
+        </p:txBody>
+      </p:sp>
+      <p:sp>
+        <p:nvSpPr>
+          <p:cNvPr id="144" name="TextBox 143"/>
+          <p:cNvSpPr txBox="1"/>
+          <p:nvPr/>
+        </p:nvSpPr>
+        <p:spPr>
+          <a:xfrm>
+            <a:off x="6072216" y="5233426"/>
+            <a:ext cx="6008622" cy="738664"/>
+          </a:xfrm>
+          <a:prstGeom prst="rect">
+            <a:avLst/>
+          </a:prstGeom>
+          <a:solidFill>
+            <a:schemeClr val="accent1">
+              <a:lumMod val="40000"/>
+              <a:lumOff val="60000"/>
+            </a:schemeClr>
+          </a:solidFill>
+          <a:effectLst>
+            <a:outerShdw blurRad="50800" dist="38100" dir="2700000" algn="tl" rotWithShape="0">
+              <a:prstClr val="black">
+                <a:alpha val="40000"/>
+              </a:prstClr>
+            </a:outerShdw>
+          </a:effectLst>
+        </p:spPr>
+        <p:txBody>
+          <a:bodyPr wrap="square" rtlCol="0">
+            <a:spAutoFit/>
+          </a:bodyPr>
+          <a:lstStyle/>
+          <a:p>
+            <a:pPr marL="285750" indent="-285750">
+              <a:buFont typeface="Arial" panose="020B0604020202020204" pitchFamily="34" charset="0"/>
+              <a:buChar char="•"/>
+            </a:pPr>
+            <a:r>
+              <a:rPr lang="en-US" sz="1400" dirty="0" smtClean="0"/>
+              <a:t>Listing of each catchment and the estimated percent likelihood of finding the species there based on current conditions (</a:t>
+            </a:r>
+            <a:r>
+              <a:rPr lang="en-US" sz="1400" u="sng" dirty="0" smtClean="0"/>
+              <a:t>unmodified</a:t>
+            </a:r>
+            <a:r>
+              <a:rPr lang="en-US" sz="1400" dirty="0" smtClean="0"/>
+              <a:t> StreamCat values).</a:t>
+            </a:r>
+            <a:endParaRPr lang="en-US" sz="1400" dirty="0"/>
+          </a:p>
+        </p:txBody>
+      </p:sp>
+      <p:sp>
+        <p:nvSpPr>
+          <p:cNvPr id="145" name="TextBox 144"/>
+          <p:cNvSpPr txBox="1"/>
+          <p:nvPr/>
+        </p:nvSpPr>
+        <p:spPr>
+          <a:xfrm flipH="1">
+            <a:off x="5644576" y="6100166"/>
+            <a:ext cx="258308" cy="307777"/>
+          </a:xfrm>
+          <a:prstGeom prst="rect">
+            <a:avLst/>
+          </a:prstGeom>
+          <a:solidFill>
+            <a:schemeClr val="accent1">
+              <a:lumMod val="40000"/>
+              <a:lumOff val="60000"/>
+            </a:schemeClr>
+          </a:solidFill>
+          <a:ln>
+            <a:noFill/>
+          </a:ln>
+          <a:effectLst>
+            <a:outerShdw blurRad="50800" dist="38100" dir="2700000" algn="tl" rotWithShape="0">
+              <a:prstClr val="black">
+                <a:alpha val="40000"/>
+              </a:prstClr>
+            </a:outerShdw>
+          </a:effectLst>
+        </p:spPr>
+        <p:style>
+          <a:lnRef idx="2">
+            <a:schemeClr val="accent1"/>
+          </a:lnRef>
+          <a:fillRef idx="1">
+            <a:schemeClr val="lt1"/>
+          </a:fillRef>
+          <a:effectRef idx="0">
+            <a:schemeClr val="accent1"/>
+          </a:effectRef>
+          <a:fontRef idx="minor">
+            <a:schemeClr val="dk1"/>
+          </a:fontRef>
+        </p:style>
+        <p:txBody>
+          <a:bodyPr wrap="square" rtlCol="0">
+            <a:spAutoFit/>
+          </a:bodyPr>
+          <a:lstStyle/>
+          <a:p>
+            <a:pPr algn="ctr"/>
+            <a:r>
+              <a:rPr lang="en-US" sz="1400" i="1" dirty="0" smtClean="0">
+                <a:solidFill>
+                  <a:schemeClr val="tx1"/>
+                </a:solidFill>
+              </a:rPr>
+              <a:t>5</a:t>
+            </a:r>
+            <a:endParaRPr lang="en-US" sz="1400" i="1" dirty="0">
+              <a:solidFill>
+                <a:schemeClr val="tx1"/>
+              </a:solidFill>
+            </a:endParaRPr>
+          </a:p>
+        </p:txBody>
+      </p:sp>
+      <p:sp>
+        <p:nvSpPr>
+          <p:cNvPr id="146" name="TextBox 145"/>
+          <p:cNvSpPr txBox="1"/>
+          <p:nvPr/>
+        </p:nvSpPr>
+        <p:spPr>
+          <a:xfrm>
+            <a:off x="6072216" y="6100166"/>
+            <a:ext cx="6008622" cy="523220"/>
+          </a:xfrm>
+          <a:prstGeom prst="rect">
+            <a:avLst/>
+          </a:prstGeom>
+          <a:solidFill>
+            <a:schemeClr val="accent1">
+              <a:lumMod val="40000"/>
+              <a:lumOff val="60000"/>
+            </a:schemeClr>
+          </a:solidFill>
+          <a:effectLst>
+            <a:outerShdw blurRad="50800" dist="38100" dir="2700000" algn="tl" rotWithShape="0">
+              <a:prstClr val="black">
+                <a:alpha val="40000"/>
+              </a:prstClr>
+            </a:outerShdw>
+          </a:effectLst>
+        </p:spPr>
+        <p:txBody>
+          <a:bodyPr wrap="square" rtlCol="0">
+            <a:spAutoFit/>
+          </a:bodyPr>
+          <a:lstStyle/>
+          <a:p>
+            <a:pPr marL="285750" indent="-285750">
+              <a:buFont typeface="Arial" panose="020B0604020202020204" pitchFamily="34" charset="0"/>
+              <a:buChar char="•"/>
+            </a:pPr>
+            <a:r>
+              <a:rPr lang="en-US" sz="1400" dirty="0" smtClean="0"/>
+              <a:t>Listing of each catchment and the estimated percent likelihood of finding the species there based on altered conditions (</a:t>
+            </a:r>
+            <a:r>
+              <a:rPr lang="en-US" sz="1400" u="sng" dirty="0" smtClean="0"/>
+              <a:t>modified</a:t>
+            </a:r>
+            <a:r>
+              <a:rPr lang="en-US" sz="1400" dirty="0" smtClean="0"/>
+              <a:t> StreamCat values).</a:t>
+            </a:r>
+            <a:endParaRPr lang="en-US" sz="1400" dirty="0"/>
+          </a:p>
+        </p:txBody>
+      </p:sp>
     </p:spTree>
     <p:extLst>
       <p:ext uri="{BB962C8B-B14F-4D97-AF65-F5344CB8AC3E}">
         <p14:creationId xmlns:p14="http://schemas.microsoft.com/office/powerpoint/2010/main" val="935377959"/>
+      </p:ext>
+    </p:extLst>
+  </p:cSld>
+  <p:clrMapOvr>
+    <a:masterClrMapping/>
+  </p:clrMapOvr>
+</p:sld>
+</file>
+
+<file path=ppt/slides/slide4.xml><?xml version="1.0" encoding="utf-8"?>
+<p:sld xmlns:a="http://schemas.openxmlformats.org/drawingml/2006/main" xmlns:r="http://schemas.openxmlformats.org/officeDocument/2006/relationships" xmlns:p="http://schemas.openxmlformats.org/presentationml/2006/main">
+  <p:cSld>
+    <p:spTree>
+      <p:nvGrpSpPr>
+        <p:cNvPr id="1" name=""/>
+        <p:cNvGrpSpPr/>
+        <p:nvPr/>
+      </p:nvGrpSpPr>
+      <p:grpSpPr>
+        <a:xfrm>
+          <a:off x="0" y="0"/>
+          <a:ext cx="0" cy="0"/>
+          <a:chOff x="0" y="0"/>
+          <a:chExt cx="0" cy="0"/>
+        </a:xfrm>
+      </p:grpSpPr>
+    </p:spTree>
+    <p:extLst>
+      <p:ext uri="{BB962C8B-B14F-4D97-AF65-F5344CB8AC3E}">
+        <p14:creationId xmlns:p14="http://schemas.microsoft.com/office/powerpoint/2010/main" val="2285474562"/>
       </p:ext>
     </p:extLst>
   </p:cSld>
@@ -5072,4 +7237,265 @@
     </a:ext>
   </a:extLst>
 </a:theme>
+</file>
+
+<file path=ppt/theme/theme2.xml><?xml version="1.0" encoding="utf-8"?>
+<a:theme xmlns:a="http://schemas.openxmlformats.org/drawingml/2006/main" name="Office Theme">
+  <a:themeElements>
+    <a:clrScheme name="Office">
+      <a:dk1>
+        <a:sysClr val="windowText" lastClr="000000"/>
+      </a:dk1>
+      <a:lt1>
+        <a:sysClr val="window" lastClr="FFFFFF"/>
+      </a:lt1>
+      <a:dk2>
+        <a:srgbClr val="44546A"/>
+      </a:dk2>
+      <a:lt2>
+        <a:srgbClr val="E7E6E6"/>
+      </a:lt2>
+      <a:accent1>
+        <a:srgbClr val="5B9BD5"/>
+      </a:accent1>
+      <a:accent2>
+        <a:srgbClr val="ED7D31"/>
+      </a:accent2>
+      <a:accent3>
+        <a:srgbClr val="A5A5A5"/>
+      </a:accent3>
+      <a:accent4>
+        <a:srgbClr val="FFC000"/>
+      </a:accent4>
+      <a:accent5>
+        <a:srgbClr val="4472C4"/>
+      </a:accent5>
+      <a:accent6>
+        <a:srgbClr val="70AD47"/>
+      </a:accent6>
+      <a:hlink>
+        <a:srgbClr val="0563C1"/>
+      </a:hlink>
+      <a:folHlink>
+        <a:srgbClr val="954F72"/>
+      </a:folHlink>
+    </a:clrScheme>
+    <a:fontScheme name="Office">
+      <a:majorFont>
+        <a:latin typeface="Calibri Light" panose="020F0302020204030204"/>
+        <a:ea typeface=""/>
+        <a:cs typeface=""/>
+        <a:font script="Jpan" typeface="游ゴシック Light"/>
+        <a:font script="Hang" typeface="맑은 고딕"/>
+        <a:font script="Hans" typeface="等线 Light"/>
+        <a:font script="Hant" typeface="新細明體"/>
+        <a:font script="Arab" typeface="Times New Roman"/>
+        <a:font script="Hebr" typeface="Times New Roman"/>
+        <a:font script="Thai" typeface="Angsana New"/>
+        <a:font script="Ethi" typeface="Nyala"/>
+        <a:font script="Beng" typeface="Vrinda"/>
+        <a:font script="Gujr" typeface="Shruti"/>
+        <a:font script="Khmr" typeface="MoolBoran"/>
+        <a:font script="Knda" typeface="Tunga"/>
+        <a:font script="Guru" typeface="Raavi"/>
+        <a:font script="Cans" typeface="Euphemia"/>
+        <a:font script="Cher" typeface="Plantagenet Cherokee"/>
+        <a:font script="Yiii" typeface="Microsoft Yi Baiti"/>
+        <a:font script="Tibt" typeface="Microsoft Himalaya"/>
+        <a:font script="Thaa" typeface="MV Boli"/>
+        <a:font script="Deva" typeface="Mangal"/>
+        <a:font script="Telu" typeface="Gautami"/>
+        <a:font script="Taml" typeface="Latha"/>
+        <a:font script="Syrc" typeface="Estrangelo Edessa"/>
+        <a:font script="Orya" typeface="Kalinga"/>
+        <a:font script="Mlym" typeface="Kartika"/>
+        <a:font script="Laoo" typeface="DokChampa"/>
+        <a:font script="Sinh" typeface="Iskoola Pota"/>
+        <a:font script="Mong" typeface="Mongolian Baiti"/>
+        <a:font script="Viet" typeface="Times New Roman"/>
+        <a:font script="Uigh" typeface="Microsoft Uighur"/>
+        <a:font script="Geor" typeface="Sylfaen"/>
+      </a:majorFont>
+      <a:minorFont>
+        <a:latin typeface="Calibri" panose="020F0502020204030204"/>
+        <a:ea typeface=""/>
+        <a:cs typeface=""/>
+        <a:font script="Jpan" typeface="游ゴシック"/>
+        <a:font script="Hang" typeface="맑은 고딕"/>
+        <a:font script="Hans" typeface="等线"/>
+        <a:font script="Hant" typeface="新細明體"/>
+        <a:font script="Arab" typeface="Arial"/>
+        <a:font script="Hebr" typeface="Arial"/>
+        <a:font script="Thai" typeface="Cordia New"/>
+        <a:font script="Ethi" typeface="Nyala"/>
+        <a:font script="Beng" typeface="Vrinda"/>
+        <a:font script="Gujr" typeface="Shruti"/>
+        <a:font script="Khmr" typeface="DaunPenh"/>
+        <a:font script="Knda" typeface="Tunga"/>
+        <a:font script="Guru" typeface="Raavi"/>
+        <a:font script="Cans" typeface="Euphemia"/>
+        <a:font script="Cher" typeface="Plantagenet Cherokee"/>
+        <a:font script="Yiii" typeface="Microsoft Yi Baiti"/>
+        <a:font script="Tibt" typeface="Microsoft Himalaya"/>
+        <a:font script="Thaa" typeface="MV Boli"/>
+        <a:font script="Deva" typeface="Mangal"/>
+        <a:font script="Telu" typeface="Gautami"/>
+        <a:font script="Taml" typeface="Latha"/>
+        <a:font script="Syrc" typeface="Estrangelo Edessa"/>
+        <a:font script="Orya" typeface="Kalinga"/>
+        <a:font script="Mlym" typeface="Kartika"/>
+        <a:font script="Laoo" typeface="DokChampa"/>
+        <a:font script="Sinh" typeface="Iskoola Pota"/>
+        <a:font script="Mong" typeface="Mongolian Baiti"/>
+        <a:font script="Viet" typeface="Arial"/>
+        <a:font script="Uigh" typeface="Microsoft Uighur"/>
+        <a:font script="Geor" typeface="Sylfaen"/>
+      </a:minorFont>
+    </a:fontScheme>
+    <a:fmtScheme name="Office">
+      <a:fillStyleLst>
+        <a:solidFill>
+          <a:schemeClr val="phClr"/>
+        </a:solidFill>
+        <a:gradFill rotWithShape="1">
+          <a:gsLst>
+            <a:gs pos="0">
+              <a:schemeClr val="phClr">
+                <a:lumMod val="110000"/>
+                <a:satMod val="105000"/>
+                <a:tint val="67000"/>
+              </a:schemeClr>
+            </a:gs>
+            <a:gs pos="50000">
+              <a:schemeClr val="phClr">
+                <a:lumMod val="105000"/>
+                <a:satMod val="103000"/>
+                <a:tint val="73000"/>
+              </a:schemeClr>
+            </a:gs>
+            <a:gs pos="100000">
+              <a:schemeClr val="phClr">
+                <a:lumMod val="105000"/>
+                <a:satMod val="109000"/>
+                <a:tint val="81000"/>
+              </a:schemeClr>
+            </a:gs>
+          </a:gsLst>
+          <a:lin ang="5400000" scaled="0"/>
+        </a:gradFill>
+        <a:gradFill rotWithShape="1">
+          <a:gsLst>
+            <a:gs pos="0">
+              <a:schemeClr val="phClr">
+                <a:satMod val="103000"/>
+                <a:lumMod val="102000"/>
+                <a:tint val="94000"/>
+              </a:schemeClr>
+            </a:gs>
+            <a:gs pos="50000">
+              <a:schemeClr val="phClr">
+                <a:satMod val="110000"/>
+                <a:lumMod val="100000"/>
+                <a:shade val="100000"/>
+              </a:schemeClr>
+            </a:gs>
+            <a:gs pos="100000">
+              <a:schemeClr val="phClr">
+                <a:lumMod val="99000"/>
+                <a:satMod val="120000"/>
+                <a:shade val="78000"/>
+              </a:schemeClr>
+            </a:gs>
+          </a:gsLst>
+          <a:lin ang="5400000" scaled="0"/>
+        </a:gradFill>
+      </a:fillStyleLst>
+      <a:lnStyleLst>
+        <a:ln w="6350" cap="flat" cmpd="sng" algn="ctr">
+          <a:solidFill>
+            <a:schemeClr val="phClr"/>
+          </a:solidFill>
+          <a:prstDash val="solid"/>
+          <a:miter lim="800000"/>
+        </a:ln>
+        <a:ln w="12700" cap="flat" cmpd="sng" algn="ctr">
+          <a:solidFill>
+            <a:schemeClr val="phClr"/>
+          </a:solidFill>
+          <a:prstDash val="solid"/>
+          <a:miter lim="800000"/>
+        </a:ln>
+        <a:ln w="19050" cap="flat" cmpd="sng" algn="ctr">
+          <a:solidFill>
+            <a:schemeClr val="phClr"/>
+          </a:solidFill>
+          <a:prstDash val="solid"/>
+          <a:miter lim="800000"/>
+        </a:ln>
+      </a:lnStyleLst>
+      <a:effectStyleLst>
+        <a:effectStyle>
+          <a:effectLst/>
+        </a:effectStyle>
+        <a:effectStyle>
+          <a:effectLst/>
+        </a:effectStyle>
+        <a:effectStyle>
+          <a:effectLst>
+            <a:outerShdw blurRad="57150" dist="19050" dir="5400000" algn="ctr" rotWithShape="0">
+              <a:srgbClr val="000000">
+                <a:alpha val="63000"/>
+              </a:srgbClr>
+            </a:outerShdw>
+          </a:effectLst>
+        </a:effectStyle>
+      </a:effectStyleLst>
+      <a:bgFillStyleLst>
+        <a:solidFill>
+          <a:schemeClr val="phClr"/>
+        </a:solidFill>
+        <a:solidFill>
+          <a:schemeClr val="phClr">
+            <a:tint val="95000"/>
+            <a:satMod val="170000"/>
+          </a:schemeClr>
+        </a:solidFill>
+        <a:gradFill rotWithShape="1">
+          <a:gsLst>
+            <a:gs pos="0">
+              <a:schemeClr val="phClr">
+                <a:tint val="93000"/>
+                <a:satMod val="150000"/>
+                <a:shade val="98000"/>
+                <a:lumMod val="102000"/>
+              </a:schemeClr>
+            </a:gs>
+            <a:gs pos="50000">
+              <a:schemeClr val="phClr">
+                <a:tint val="98000"/>
+                <a:satMod val="130000"/>
+                <a:shade val="90000"/>
+                <a:lumMod val="103000"/>
+              </a:schemeClr>
+            </a:gs>
+            <a:gs pos="100000">
+              <a:schemeClr val="phClr">
+                <a:shade val="63000"/>
+                <a:satMod val="120000"/>
+              </a:schemeClr>
+            </a:gs>
+          </a:gsLst>
+          <a:lin ang="5400000" scaled="0"/>
+        </a:gradFill>
+      </a:bgFillStyleLst>
+    </a:fmtScheme>
+  </a:themeElements>
+  <a:objectDefaults/>
+  <a:extraClrSchemeLst/>
+  <a:extLst>
+    <a:ext uri="{05A4C25C-085E-4340-85A3-A5531E510DB2}">
+      <thm15:themeFamily xmlns:thm15="http://schemas.microsoft.com/office/thememl/2012/main" name="Office Theme" id="{62F939B6-93AF-4DB8-9C6B-D6C7DFDC589F}" vid="{4A3C46E8-61CC-4603-A589-7422A47A8E4A}"/>
+    </a:ext>
+  </a:extLst>
+</a:theme>
 </file>
</xml_diff>

<commit_message>
Notes on project workflow
</commit_message>
<xml_diff>
--- a/Docs/ToolDesign.pptx
+++ b/Docs/ToolDesign.pptx
@@ -133,9 +133,9 @@
 <file path=ppt/comments/comment1.xml><?xml version="1.0" encoding="utf-8"?>
 <p:cmLst xmlns:a="http://schemas.openxmlformats.org/drawingml/2006/main" xmlns:r="http://schemas.openxmlformats.org/officeDocument/2006/relationships" xmlns:p="http://schemas.openxmlformats.org/presentationml/2006/main">
   <p:cm authorId="1" dt="2016-06-14T09:54:43.958" idx="1">
-    <p:pos x="10" y="10"/>
+    <p:pos x="7447" y="-7"/>
     <p:text>GIS tools requires a table that maps land cover modifications to specific StreamCat attribute changes. For example, a conversion of 30 HA of cropland to forest will change: (1) Pct cropland in catchment and watershed, (2) Pct wetland in catchment and watershed, ….</p:text>
-    <p:extLst>
+    <p:extLst mod="1">
       <p:ext uri="{C676402C-5697-4E1C-873F-D02D1690AC5C}">
         <p15:threadingInfo xmlns:p15="http://schemas.microsoft.com/office/powerpoint/2012/main" timeZoneBias="-600"/>
       </p:ext>
@@ -226,7 +226,7 @@
           <a:p>
             <a:fld id="{2E46F0EA-5151-4461-8156-A78D49B8FD41}" type="datetimeFigureOut">
               <a:rPr lang="en-US" smtClean="0"/>
-              <a:t>6/14/2016</a:t>
+              <a:t>6/16/2016</a:t>
             </a:fld>
             <a:endParaRPr lang="en-US"/>
           </a:p>
@@ -540,7 +540,11 @@
           <a:p>
             <a:r>
               <a:rPr lang="en-US" dirty="0" smtClean="0"/>
-              <a:t>Aquatic habitat uplift</a:t>
+              <a:t>Aquatic habitat </a:t>
+            </a:r>
+            <a:r>
+              <a:rPr lang="en-US" dirty="0" smtClean="0"/>
+              <a:t>uplift</a:t>
             </a:r>
             <a:endParaRPr lang="en-US" dirty="0"/>
           </a:p>
@@ -573,6 +577,98 @@
     <p:extLst>
       <p:ext uri="{BB962C8B-B14F-4D97-AF65-F5344CB8AC3E}">
         <p14:creationId xmlns:p14="http://schemas.microsoft.com/office/powerpoint/2010/main" val="1691603921"/>
+      </p:ext>
+    </p:extLst>
+  </p:cSld>
+  <p:clrMapOvr>
+    <a:masterClrMapping/>
+  </p:clrMapOvr>
+</p:notes>
+</file>
+
+<file path=ppt/notesSlides/notesSlide2.xml><?xml version="1.0" encoding="utf-8"?>
+<p:notes xmlns:a="http://schemas.openxmlformats.org/drawingml/2006/main" xmlns:r="http://schemas.openxmlformats.org/officeDocument/2006/relationships" xmlns:p="http://schemas.openxmlformats.org/presentationml/2006/main">
+  <p:cSld>
+    <p:spTree>
+      <p:nvGrpSpPr>
+        <p:cNvPr id="1" name=""/>
+        <p:cNvGrpSpPr/>
+        <p:nvPr/>
+      </p:nvGrpSpPr>
+      <p:grpSpPr>
+        <a:xfrm>
+          <a:off x="0" y="0"/>
+          <a:ext cx="0" cy="0"/>
+          <a:chOff x="0" y="0"/>
+          <a:chExt cx="0" cy="0"/>
+        </a:xfrm>
+      </p:grpSpPr>
+      <p:sp>
+        <p:nvSpPr>
+          <p:cNvPr id="2" name="Slide Image Placeholder 1"/>
+          <p:cNvSpPr>
+            <a:spLocks noGrp="1" noRot="1" noChangeAspect="1"/>
+          </p:cNvSpPr>
+          <p:nvPr>
+            <p:ph type="sldImg"/>
+          </p:nvPr>
+        </p:nvSpPr>
+        <p:spPr/>
+      </p:sp>
+      <p:sp>
+        <p:nvSpPr>
+          <p:cNvPr id="3" name="Notes Placeholder 2"/>
+          <p:cNvSpPr>
+            <a:spLocks noGrp="1"/>
+          </p:cNvSpPr>
+          <p:nvPr>
+            <p:ph type="body" idx="1"/>
+          </p:nvPr>
+        </p:nvSpPr>
+        <p:spPr/>
+        <p:txBody>
+          <a:bodyPr/>
+          <a:lstStyle/>
+          <a:p>
+            <a:r>
+              <a:rPr lang="en-US" dirty="0" smtClean="0"/>
+              <a:t>GIS tool to create a modified SWD file</a:t>
+            </a:r>
+            <a:r>
+              <a:rPr lang="en-US" baseline="0" dirty="0" smtClean="0"/>
+              <a:t> for the HUC8</a:t>
+            </a:r>
+            <a:endParaRPr lang="en-US" dirty="0"/>
+          </a:p>
+        </p:txBody>
+      </p:sp>
+      <p:sp>
+        <p:nvSpPr>
+          <p:cNvPr id="4" name="Slide Number Placeholder 3"/>
+          <p:cNvSpPr>
+            <a:spLocks noGrp="1"/>
+          </p:cNvSpPr>
+          <p:nvPr>
+            <p:ph type="sldNum" sz="quarter" idx="10"/>
+          </p:nvPr>
+        </p:nvSpPr>
+        <p:spPr/>
+        <p:txBody>
+          <a:bodyPr/>
+          <a:lstStyle/>
+          <a:p>
+            <a:fld id="{2FDC19FB-B5BF-4AF1-A018-EAD8D29F4C16}" type="slidenum">
+              <a:rPr lang="en-US" smtClean="0"/>
+              <a:t>4</a:t>
+            </a:fld>
+            <a:endParaRPr lang="en-US"/>
+          </a:p>
+        </p:txBody>
+      </p:sp>
+    </p:spTree>
+    <p:extLst>
+      <p:ext uri="{BB962C8B-B14F-4D97-AF65-F5344CB8AC3E}">
+        <p14:creationId xmlns:p14="http://schemas.microsoft.com/office/powerpoint/2010/main" val="3167450615"/>
       </p:ext>
     </p:extLst>
   </p:cSld>
@@ -713,7 +809,7 @@
           <a:p>
             <a:fld id="{E4657354-A55A-4A62-BC37-84652271ECE7}" type="datetimeFigureOut">
               <a:rPr lang="en-US" smtClean="0"/>
-              <a:t>6/14/2016</a:t>
+              <a:t>6/16/2016</a:t>
             </a:fld>
             <a:endParaRPr lang="en-US"/>
           </a:p>
@@ -883,7 +979,7 @@
           <a:p>
             <a:fld id="{E4657354-A55A-4A62-BC37-84652271ECE7}" type="datetimeFigureOut">
               <a:rPr lang="en-US" smtClean="0"/>
-              <a:t>6/14/2016</a:t>
+              <a:t>6/16/2016</a:t>
             </a:fld>
             <a:endParaRPr lang="en-US"/>
           </a:p>
@@ -1063,7 +1159,7 @@
           <a:p>
             <a:fld id="{E4657354-A55A-4A62-BC37-84652271ECE7}" type="datetimeFigureOut">
               <a:rPr lang="en-US" smtClean="0"/>
-              <a:t>6/14/2016</a:t>
+              <a:t>6/16/2016</a:t>
             </a:fld>
             <a:endParaRPr lang="en-US"/>
           </a:p>
@@ -1233,7 +1329,7 @@
           <a:p>
             <a:fld id="{E4657354-A55A-4A62-BC37-84652271ECE7}" type="datetimeFigureOut">
               <a:rPr lang="en-US" smtClean="0"/>
-              <a:t>6/14/2016</a:t>
+              <a:t>6/16/2016</a:t>
             </a:fld>
             <a:endParaRPr lang="en-US"/>
           </a:p>
@@ -1479,7 +1575,7 @@
           <a:p>
             <a:fld id="{E4657354-A55A-4A62-BC37-84652271ECE7}" type="datetimeFigureOut">
               <a:rPr lang="en-US" smtClean="0"/>
-              <a:t>6/14/2016</a:t>
+              <a:t>6/16/2016</a:t>
             </a:fld>
             <a:endParaRPr lang="en-US"/>
           </a:p>
@@ -1711,7 +1807,7 @@
           <a:p>
             <a:fld id="{E4657354-A55A-4A62-BC37-84652271ECE7}" type="datetimeFigureOut">
               <a:rPr lang="en-US" smtClean="0"/>
-              <a:t>6/14/2016</a:t>
+              <a:t>6/16/2016</a:t>
             </a:fld>
             <a:endParaRPr lang="en-US"/>
           </a:p>
@@ -2078,7 +2174,7 @@
           <a:p>
             <a:fld id="{E4657354-A55A-4A62-BC37-84652271ECE7}" type="datetimeFigureOut">
               <a:rPr lang="en-US" smtClean="0"/>
-              <a:t>6/14/2016</a:t>
+              <a:t>6/16/2016</a:t>
             </a:fld>
             <a:endParaRPr lang="en-US"/>
           </a:p>
@@ -2196,7 +2292,7 @@
           <a:p>
             <a:fld id="{E4657354-A55A-4A62-BC37-84652271ECE7}" type="datetimeFigureOut">
               <a:rPr lang="en-US" smtClean="0"/>
-              <a:t>6/14/2016</a:t>
+              <a:t>6/16/2016</a:t>
             </a:fld>
             <a:endParaRPr lang="en-US"/>
           </a:p>
@@ -2291,7 +2387,7 @@
           <a:p>
             <a:fld id="{E4657354-A55A-4A62-BC37-84652271ECE7}" type="datetimeFigureOut">
               <a:rPr lang="en-US" smtClean="0"/>
-              <a:t>6/14/2016</a:t>
+              <a:t>6/16/2016</a:t>
             </a:fld>
             <a:endParaRPr lang="en-US"/>
           </a:p>
@@ -2568,7 +2664,7 @@
           <a:p>
             <a:fld id="{E4657354-A55A-4A62-BC37-84652271ECE7}" type="datetimeFigureOut">
               <a:rPr lang="en-US" smtClean="0"/>
-              <a:t>6/14/2016</a:t>
+              <a:t>6/16/2016</a:t>
             </a:fld>
             <a:endParaRPr lang="en-US"/>
           </a:p>
@@ -2821,7 +2917,7 @@
           <a:p>
             <a:fld id="{E4657354-A55A-4A62-BC37-84652271ECE7}" type="datetimeFigureOut">
               <a:rPr lang="en-US" smtClean="0"/>
-              <a:t>6/14/2016</a:t>
+              <a:t>6/16/2016</a:t>
             </a:fld>
             <a:endParaRPr lang="en-US"/>
           </a:p>
@@ -3034,7 +3130,7 @@
           <a:p>
             <a:fld id="{E4657354-A55A-4A62-BC37-84652271ECE7}" type="datetimeFigureOut">
               <a:rPr lang="en-US" smtClean="0"/>
-              <a:t>6/14/2016</a:t>
+              <a:t>6/16/2016</a:t>
             </a:fld>
             <a:endParaRPr lang="en-US"/>
           </a:p>
@@ -4667,11 +4763,7 @@
             <a:pPr algn="ctr"/>
             <a:r>
               <a:rPr lang="en-US" sz="1200" dirty="0" smtClean="0"/>
-              <a:t>Aq. Species </a:t>
-            </a:r>
-            <a:r>
-              <a:rPr lang="en-US" sz="1200" dirty="0" smtClean="0"/>
-              <a:t>Presences CSV file</a:t>
+              <a:t>Aq. Species Presences CSV file</a:t>
             </a:r>
             <a:endParaRPr lang="en-US" sz="1200" dirty="0"/>
           </a:p>
@@ -4777,15 +4869,7 @@
                   <a:schemeClr val="tx1"/>
                 </a:solidFill>
               </a:rPr>
-              <a:t>GIS </a:t>
-            </a:r>
-            <a:r>
-              <a:rPr lang="en-US" sz="1200" dirty="0" smtClean="0">
-                <a:solidFill>
-                  <a:schemeClr val="tx1"/>
-                </a:solidFill>
-              </a:rPr>
-              <a:t>Tool</a:t>
+              <a:t>GIS Tool</a:t>
             </a:r>
             <a:endParaRPr lang="en-US" sz="1200" dirty="0">
               <a:solidFill>
@@ -4909,23 +4993,7 @@
                   <a:schemeClr val="tx1"/>
                 </a:solidFill>
               </a:rPr>
-              <a:t>Extract </a:t>
-            </a:r>
-            <a:r>
-              <a:rPr lang="en-US" sz="1200" dirty="0" smtClean="0">
-                <a:solidFill>
-                  <a:schemeClr val="tx1"/>
-                </a:solidFill>
-              </a:rPr>
-              <a:t>Species </a:t>
-            </a:r>
-            <a:r>
-              <a:rPr lang="en-US" sz="1200" dirty="0" smtClean="0">
-                <a:solidFill>
-                  <a:schemeClr val="tx1"/>
-                </a:solidFill>
-              </a:rPr>
-              <a:t>Data &amp; create MaxEnt SWD File</a:t>
+              <a:t>Extract Species Data &amp; create MaxEnt SWD File</a:t>
             </a:r>
             <a:endParaRPr lang="en-US" sz="1200" dirty="0">
               <a:solidFill>
@@ -6965,6 +7033,132 @@
           <a:chExt cx="0" cy="0"/>
         </a:xfrm>
       </p:grpSpPr>
+      <p:sp>
+        <p:nvSpPr>
+          <p:cNvPr id="2" name="TextBox 1"/>
+          <p:cNvSpPr txBox="1"/>
+          <p:nvPr/>
+        </p:nvSpPr>
+        <p:spPr>
+          <a:xfrm>
+            <a:off x="766482" y="376518"/>
+            <a:ext cx="6036974" cy="2308324"/>
+          </a:xfrm>
+          <a:prstGeom prst="rect">
+            <a:avLst/>
+          </a:prstGeom>
+          <a:noFill/>
+        </p:spPr>
+        <p:txBody>
+          <a:bodyPr wrap="none" rtlCol="0">
+            <a:spAutoFit/>
+          </a:bodyPr>
+          <a:lstStyle/>
+          <a:p>
+            <a:pPr marL="285750" indent="-285750">
+              <a:buFont typeface="Arial" panose="020B0604020202020204" pitchFamily="34" charset="0"/>
+              <a:buChar char="•"/>
+            </a:pPr>
+            <a:r>
+              <a:rPr lang="en-US" dirty="0" smtClean="0"/>
+              <a:t>Get list of stream cat files that will be affected</a:t>
+            </a:r>
+          </a:p>
+          <a:p>
+            <a:pPr marL="285750" indent="-285750">
+              <a:buFont typeface="Arial" panose="020B0604020202020204" pitchFamily="34" charset="0"/>
+              <a:buChar char="•"/>
+            </a:pPr>
+            <a:r>
+              <a:rPr lang="en-US" dirty="0" smtClean="0"/>
+              <a:t>Extract stream cat records for HUC 8 </a:t>
+            </a:r>
+            <a:r>
+              <a:rPr lang="en-US" dirty="0" smtClean="0">
+                <a:sym typeface="Wingdings" panose="05000000000000000000" pitchFamily="2" charset="2"/>
+              </a:rPr>
+              <a:t> </a:t>
+            </a:r>
+            <a:r>
+              <a:rPr lang="en-US" dirty="0" err="1" smtClean="0">
+                <a:sym typeface="Wingdings" panose="05000000000000000000" pitchFamily="2" charset="2"/>
+              </a:rPr>
+              <a:t>dataDF</a:t>
+            </a:r>
+            <a:endParaRPr lang="en-US" dirty="0" smtClean="0"/>
+          </a:p>
+          <a:p>
+            <a:pPr marL="285750" indent="-285750">
+              <a:buFont typeface="Arial" panose="020B0604020202020204" pitchFamily="34" charset="0"/>
+              <a:buChar char="•"/>
+            </a:pPr>
+            <a:r>
+              <a:rPr lang="en-US" dirty="0" smtClean="0"/>
+              <a:t>Update catchment records</a:t>
+            </a:r>
+          </a:p>
+          <a:p>
+            <a:pPr marL="742950" lvl="1" indent="-285750">
+              <a:buFont typeface="Arial" panose="020B0604020202020204" pitchFamily="34" charset="0"/>
+              <a:buChar char="•"/>
+            </a:pPr>
+            <a:r>
+              <a:rPr lang="en-US" dirty="0" smtClean="0"/>
+              <a:t>Identify land cover change underneath project</a:t>
+            </a:r>
+          </a:p>
+          <a:p>
+            <a:pPr marL="742950" lvl="1" indent="-285750">
+              <a:buFont typeface="Arial" panose="020B0604020202020204" pitchFamily="34" charset="0"/>
+              <a:buChar char="•"/>
+            </a:pPr>
+            <a:r>
+              <a:rPr lang="en-US" dirty="0" smtClean="0"/>
+              <a:t>Decrease values in catchment records of </a:t>
+            </a:r>
+            <a:r>
+              <a:rPr lang="en-US" dirty="0" err="1" smtClean="0"/>
+              <a:t>dataDF</a:t>
+            </a:r>
+            <a:endParaRPr lang="en-US" dirty="0" smtClean="0"/>
+          </a:p>
+          <a:p>
+            <a:pPr marL="285750" indent="-285750">
+              <a:buFont typeface="Arial" panose="020B0604020202020204" pitchFamily="34" charset="0"/>
+              <a:buChar char="•"/>
+            </a:pPr>
+            <a:r>
+              <a:rPr lang="en-US" dirty="0" smtClean="0"/>
+              <a:t>Update watershed records</a:t>
+            </a:r>
+          </a:p>
+          <a:p>
+            <a:pPr marL="742950" lvl="1" indent="-285750">
+              <a:buFont typeface="Arial" panose="020B0604020202020204" pitchFamily="34" charset="0"/>
+              <a:buChar char="•"/>
+            </a:pPr>
+            <a:r>
+              <a:rPr lang="en-US" dirty="0" smtClean="0"/>
+              <a:t>Identify catchments downstream of project catchment</a:t>
+            </a:r>
+          </a:p>
+          <a:p>
+            <a:pPr marL="742950" lvl="1" indent="-285750">
+              <a:buFont typeface="Arial" panose="020B0604020202020204" pitchFamily="34" charset="0"/>
+              <a:buChar char="•"/>
+            </a:pPr>
+            <a:r>
+              <a:rPr lang="en-US" dirty="0" smtClean="0"/>
+              <a:t>Update </a:t>
+            </a:r>
+            <a:r>
+              <a:rPr lang="en-US" smtClean="0"/>
+              <a:t>attribute records</a:t>
+            </a:r>
+            <a:endParaRPr lang="en-US" dirty="0"/>
+          </a:p>
+        </p:txBody>
+      </p:sp>
     </p:spTree>
     <p:extLst>
       <p:ext uri="{BB962C8B-B14F-4D97-AF65-F5344CB8AC3E}">

</xml_diff>